<commit_message>
PPTX update 2020-01-16 18:13:00
</commit_message>
<xml_diff>
--- a/FinalProjectDesign.pptx
+++ b/FinalProjectDesign.pptx
@@ -119,7 +119,7 @@
   </p:defaultTextStyle>
   <p:extLst>
     <p:ext uri="{EFAFB233-063F-42B5-8137-9DF3F51BA10A}">
-      <p15:sldGuideLst xmlns:p15="http://schemas.microsoft.com/office/powerpoint/2012/main"/>
+      <p15:sldGuideLst xmlns:p15="http://schemas.microsoft.com/office/powerpoint/2012/main" xmlns=""/>
     </p:ext>
   </p:extLst>
 </p:presentation>
@@ -1147,6 +1147,13 @@
         </dgm:presLayoutVars>
       </dgm:prSet>
       <dgm:spPr/>
+      <dgm:t>
+        <a:bodyPr/>
+        <a:lstStyle/>
+        <a:p>
+          <a:endParaRPr lang="en-US"/>
+        </a:p>
+      </dgm:t>
     </dgm:pt>
     <dgm:pt modelId="{ACC213D4-F7CC-49CF-A2FC-5ECE192539A1}" type="pres">
       <dgm:prSet presAssocID="{53C14959-D684-449D-8E87-29848337B331}" presName="parenttextcomposite" presStyleCnt="0"/>
@@ -1161,6 +1168,13 @@
         </dgm:presLayoutVars>
       </dgm:prSet>
       <dgm:spPr/>
+      <dgm:t>
+        <a:bodyPr/>
+        <a:lstStyle/>
+        <a:p>
+          <a:endParaRPr lang="en-US"/>
+        </a:p>
+      </dgm:t>
     </dgm:pt>
     <dgm:pt modelId="{38D2CAEC-5B50-45DA-866A-35F5E7E8F8FF}" type="pres">
       <dgm:prSet presAssocID="{53C14959-D684-449D-8E87-29848337B331}" presName="composite" presStyleCnt="0"/>
@@ -1203,6 +1217,13 @@
         </dgm:presLayoutVars>
       </dgm:prSet>
       <dgm:spPr/>
+      <dgm:t>
+        <a:bodyPr/>
+        <a:lstStyle/>
+        <a:p>
+          <a:endParaRPr lang="en-US"/>
+        </a:p>
+      </dgm:t>
     </dgm:pt>
     <dgm:pt modelId="{080EB490-D011-494F-8EDE-F936F7972921}" type="pres">
       <dgm:prSet presAssocID="{250132A5-16CB-4832-BAFE-25028CE2D5E6}" presName="sibTrans" presStyleCnt="0"/>
@@ -1221,6 +1242,13 @@
         </dgm:presLayoutVars>
       </dgm:prSet>
       <dgm:spPr/>
+      <dgm:t>
+        <a:bodyPr/>
+        <a:lstStyle/>
+        <a:p>
+          <a:endParaRPr lang="en-US"/>
+        </a:p>
+      </dgm:t>
     </dgm:pt>
     <dgm:pt modelId="{A792CB21-2F7D-4F11-A315-63655B7934BF}" type="pres">
       <dgm:prSet presAssocID="{2657EB20-0B38-48DD-9F8A-3B84F1B5043B}" presName="composite" presStyleCnt="0"/>
@@ -1263,6 +1291,13 @@
         </dgm:presLayoutVars>
       </dgm:prSet>
       <dgm:spPr/>
+      <dgm:t>
+        <a:bodyPr/>
+        <a:lstStyle/>
+        <a:p>
+          <a:endParaRPr lang="en-US"/>
+        </a:p>
+      </dgm:t>
     </dgm:pt>
     <dgm:pt modelId="{D4820DAC-CBBC-4531-BB5C-950A2C022E79}" type="pres">
       <dgm:prSet presAssocID="{F6D05062-DB85-4FC9-8CC1-78999591CA69}" presName="sibTrans" presStyleCnt="0"/>
@@ -1281,6 +1316,13 @@
         </dgm:presLayoutVars>
       </dgm:prSet>
       <dgm:spPr/>
+      <dgm:t>
+        <a:bodyPr/>
+        <a:lstStyle/>
+        <a:p>
+          <a:endParaRPr lang="en-US"/>
+        </a:p>
+      </dgm:t>
     </dgm:pt>
     <dgm:pt modelId="{9331952E-4951-462C-A2A1-BCB828B30481}" type="pres">
       <dgm:prSet presAssocID="{803F722D-6F3D-4FC8-B1B5-39C897B4181D}" presName="composite" presStyleCnt="0"/>
@@ -1323,22 +1365,29 @@
         </dgm:presLayoutVars>
       </dgm:prSet>
       <dgm:spPr/>
+      <dgm:t>
+        <a:bodyPr/>
+        <a:lstStyle/>
+        <a:p>
+          <a:endParaRPr lang="en-US"/>
+        </a:p>
+      </dgm:t>
     </dgm:pt>
   </dgm:ptLst>
   <dgm:cxnLst>
-    <dgm:cxn modelId="{9564B41A-421F-498D-9FF5-AC7D4E1D335D}" type="presOf" srcId="{53C14959-D684-449D-8E87-29848337B331}" destId="{DA8BAF0E-87D5-49A7-B092-35EA8B7D85AE}" srcOrd="0" destOrd="0" presId="urn:microsoft.com/office/officeart/2008/layout/VerticalAccentList"/>
-    <dgm:cxn modelId="{ECDE983F-D85A-412F-B38C-1B38992CA65C}" srcId="{F29F80FF-967F-4FB1-B9A2-325177022A2B}" destId="{53C14959-D684-449D-8E87-29848337B331}" srcOrd="0" destOrd="0" parTransId="{DF4A3E57-F2D5-4800-83C7-7D9F4E9E321D}" sibTransId="{250132A5-16CB-4832-BAFE-25028CE2D5E6}"/>
-    <dgm:cxn modelId="{5F166062-DEE0-4513-B8E0-8A1829B87692}" srcId="{803F722D-6F3D-4FC8-B1B5-39C897B4181D}" destId="{3A5296C4-4FD4-479C-844A-A38521EA416D}" srcOrd="0" destOrd="0" parTransId="{51B11C31-53CD-4B11-A754-3B7A33200EC9}" sibTransId="{A8AACD6F-47E0-47CE-94B8-6F32665D2176}"/>
-    <dgm:cxn modelId="{D42BD043-5B47-4BAA-A9B2-50BD5478C225}" type="presOf" srcId="{2657EB20-0B38-48DD-9F8A-3B84F1B5043B}" destId="{02206E88-05BB-4A40-B3B2-2ABF21FE2563}" srcOrd="0" destOrd="0" presId="urn:microsoft.com/office/officeart/2008/layout/VerticalAccentList"/>
-    <dgm:cxn modelId="{B4E2B64A-E8CF-4F45-8DB2-696AAB6AF782}" srcId="{2657EB20-0B38-48DD-9F8A-3B84F1B5043B}" destId="{3D9E226E-6C58-4144-8CD8-3CB25C5071C0}" srcOrd="0" destOrd="0" parTransId="{38BF9174-9085-4EF8-B074-F5144689A62D}" sibTransId="{E02FBA59-811B-4E72-87CA-D8ACA6B4A1D6}"/>
     <dgm:cxn modelId="{92C02F53-19DC-4984-BB34-FD1EA543CDF1}" type="presOf" srcId="{5FC58C48-C6CB-4805-BDC9-52F386714DDD}" destId="{DB7D27CB-3E68-42EB-8C07-63125D4B650C}" srcOrd="0" destOrd="0" presId="urn:microsoft.com/office/officeart/2008/layout/VerticalAccentList"/>
     <dgm:cxn modelId="{DD0E9576-5361-40D4-9021-056F98AA8B61}" type="presOf" srcId="{3D9E226E-6C58-4144-8CD8-3CB25C5071C0}" destId="{607B25DE-AF69-436D-BDC3-AB5C28222CB2}" srcOrd="0" destOrd="0" presId="urn:microsoft.com/office/officeart/2008/layout/VerticalAccentList"/>
-    <dgm:cxn modelId="{32542896-FF17-43E6-98C3-0CB704C237A1}" type="presOf" srcId="{3A5296C4-4FD4-479C-844A-A38521EA416D}" destId="{E2839EA8-42A0-42D1-9D67-6A1C5C6A781E}" srcOrd="0" destOrd="0" presId="urn:microsoft.com/office/officeart/2008/layout/VerticalAccentList"/>
+    <dgm:cxn modelId="{5F166062-DEE0-4513-B8E0-8A1829B87692}" srcId="{803F722D-6F3D-4FC8-B1B5-39C897B4181D}" destId="{3A5296C4-4FD4-479C-844A-A38521EA416D}" srcOrd="0" destOrd="0" parTransId="{51B11C31-53CD-4B11-A754-3B7A33200EC9}" sibTransId="{A8AACD6F-47E0-47CE-94B8-6F32665D2176}"/>
+    <dgm:cxn modelId="{ECDE983F-D85A-412F-B38C-1B38992CA65C}" srcId="{F29F80FF-967F-4FB1-B9A2-325177022A2B}" destId="{53C14959-D684-449D-8E87-29848337B331}" srcOrd="0" destOrd="0" parTransId="{DF4A3E57-F2D5-4800-83C7-7D9F4E9E321D}" sibTransId="{250132A5-16CB-4832-BAFE-25028CE2D5E6}"/>
+    <dgm:cxn modelId="{0EC71BD5-FBB8-4A46-830F-7A52F34BEC61}" srcId="{F29F80FF-967F-4FB1-B9A2-325177022A2B}" destId="{2657EB20-0B38-48DD-9F8A-3B84F1B5043B}" srcOrd="1" destOrd="0" parTransId="{F36150EC-4B13-489A-A1BD-9CC9D6BA6081}" sibTransId="{F6D05062-DB85-4FC9-8CC1-78999591CA69}"/>
+    <dgm:cxn modelId="{9564B41A-421F-498D-9FF5-AC7D4E1D335D}" type="presOf" srcId="{53C14959-D684-449D-8E87-29848337B331}" destId="{DA8BAF0E-87D5-49A7-B092-35EA8B7D85AE}" srcOrd="0" destOrd="0" presId="urn:microsoft.com/office/officeart/2008/layout/VerticalAccentList"/>
     <dgm:cxn modelId="{896E0CB4-47CE-42F3-A1A1-3F1F9F80C57C}" type="presOf" srcId="{F29F80FF-967F-4FB1-B9A2-325177022A2B}" destId="{29F20E66-7513-43B0-87D9-E70E80D04B17}" srcOrd="0" destOrd="0" presId="urn:microsoft.com/office/officeart/2008/layout/VerticalAccentList"/>
-    <dgm:cxn modelId="{07B0E2C0-83D1-49AA-BD21-6458D8DEA58F}" srcId="{F29F80FF-967F-4FB1-B9A2-325177022A2B}" destId="{803F722D-6F3D-4FC8-B1B5-39C897B4181D}" srcOrd="2" destOrd="0" parTransId="{CF5A278E-A322-4CDF-8FF1-772495DA297F}" sibTransId="{B87493F0-0D27-4F92-AEE1-BA71463D9C3C}"/>
-    <dgm:cxn modelId="{0EC71BD5-FBB8-4A46-830F-7A52F34BEC61}" srcId="{F29F80FF-967F-4FB1-B9A2-325177022A2B}" destId="{2657EB20-0B38-48DD-9F8A-3B84F1B5043B}" srcOrd="1" destOrd="0" parTransId="{F36150EC-4B13-489A-A1BD-9CC9D6BA6081}" sibTransId="{F6D05062-DB85-4FC9-8CC1-78999591CA69}"/>
     <dgm:cxn modelId="{649D5BDA-D14D-4F45-90B6-08D2534D5F9C}" srcId="{53C14959-D684-449D-8E87-29848337B331}" destId="{5FC58C48-C6CB-4805-BDC9-52F386714DDD}" srcOrd="0" destOrd="0" parTransId="{61032687-9A07-4512-AB23-97F02E9420DD}" sibTransId="{C441AEBB-23DA-4E56-80C7-A58192178F94}"/>
     <dgm:cxn modelId="{1985F8F7-A812-482A-BFB3-7D7C165CC98B}" type="presOf" srcId="{803F722D-6F3D-4FC8-B1B5-39C897B4181D}" destId="{D9A85663-956A-48D0-A6BD-2EBAC8814899}" srcOrd="0" destOrd="0" presId="urn:microsoft.com/office/officeart/2008/layout/VerticalAccentList"/>
+    <dgm:cxn modelId="{07B0E2C0-83D1-49AA-BD21-6458D8DEA58F}" srcId="{F29F80FF-967F-4FB1-B9A2-325177022A2B}" destId="{803F722D-6F3D-4FC8-B1B5-39C897B4181D}" srcOrd="2" destOrd="0" parTransId="{CF5A278E-A322-4CDF-8FF1-772495DA297F}" sibTransId="{B87493F0-0D27-4F92-AEE1-BA71463D9C3C}"/>
+    <dgm:cxn modelId="{32542896-FF17-43E6-98C3-0CB704C237A1}" type="presOf" srcId="{3A5296C4-4FD4-479C-844A-A38521EA416D}" destId="{E2839EA8-42A0-42D1-9D67-6A1C5C6A781E}" srcOrd="0" destOrd="0" presId="urn:microsoft.com/office/officeart/2008/layout/VerticalAccentList"/>
+    <dgm:cxn modelId="{B4E2B64A-E8CF-4F45-8DB2-696AAB6AF782}" srcId="{2657EB20-0B38-48DD-9F8A-3B84F1B5043B}" destId="{3D9E226E-6C58-4144-8CD8-3CB25C5071C0}" srcOrd="0" destOrd="0" parTransId="{38BF9174-9085-4EF8-B074-F5144689A62D}" sibTransId="{E02FBA59-811B-4E72-87CA-D8ACA6B4A1D6}"/>
+    <dgm:cxn modelId="{D42BD043-5B47-4BAA-A9B2-50BD5478C225}" type="presOf" srcId="{2657EB20-0B38-48DD-9F8A-3B84F1B5043B}" destId="{02206E88-05BB-4A40-B3B2-2ABF21FE2563}" srcOrd="0" destOrd="0" presId="urn:microsoft.com/office/officeart/2008/layout/VerticalAccentList"/>
     <dgm:cxn modelId="{6620758A-4855-47CA-B4CD-D3ADA1A76F4C}" type="presParOf" srcId="{29F20E66-7513-43B0-87D9-E70E80D04B17}" destId="{ACC213D4-F7CC-49CF-A2FC-5ECE192539A1}" srcOrd="0" destOrd="0" presId="urn:microsoft.com/office/officeart/2008/layout/VerticalAccentList"/>
     <dgm:cxn modelId="{416921DC-CA31-451E-8BB4-3B1003B3B729}" type="presParOf" srcId="{ACC213D4-F7CC-49CF-A2FC-5ECE192539A1}" destId="{DA8BAF0E-87D5-49A7-B092-35EA8B7D85AE}" srcOrd="0" destOrd="0" presId="urn:microsoft.com/office/officeart/2008/layout/VerticalAccentList"/>
     <dgm:cxn modelId="{329FAA1D-7DED-4DC8-B39B-64C9A3F2B5FE}" type="presParOf" srcId="{29F20E66-7513-43B0-87D9-E70E80D04B17}" destId="{38D2CAEC-5B50-45DA-866A-35F5E7E8F8FF}" srcOrd="1" destOrd="0" presId="urn:microsoft.com/office/officeart/2008/layout/VerticalAccentList"/>
@@ -1430,7 +1479,7 @@
         </a:bodyPr>
         <a:lstStyle/>
         <a:p>
-          <a:pPr marL="0" lvl="0" indent="0" algn="l" defTabSz="400050">
+          <a:pPr lvl="0" algn="l" defTabSz="400050">
             <a:lnSpc>
               <a:spcPct val="90000"/>
             </a:lnSpc>
@@ -1440,7 +1489,6 @@
             <a:spcAft>
               <a:spcPct val="35000"/>
             </a:spcAft>
-            <a:buNone/>
           </a:pPr>
           <a:r>
             <a:rPr lang="en-US" sz="900" kern="1200"/>
@@ -1573,7 +1621,7 @@
         </a:prstGeom>
         <a:solidFill>
           <a:schemeClr val="accent4">
-            <a:hueOff val="870159"/>
+            <a:hueOff val="870160"/>
             <a:satOff val="-1886"/>
             <a:lumOff val="-804"/>
             <a:alphaOff val="0"/>
@@ -1582,7 +1630,7 @@
         <a:ln w="10795" cap="flat" cmpd="sng" algn="ctr">
           <a:solidFill>
             <a:schemeClr val="accent4">
-              <a:hueOff val="870159"/>
+              <a:hueOff val="870160"/>
               <a:satOff val="-1886"/>
               <a:lumOff val="-804"/>
               <a:alphaOff val="0"/>
@@ -1863,7 +1911,7 @@
         </a:bodyPr>
         <a:lstStyle/>
         <a:p>
-          <a:pPr marL="0" lvl="0" indent="0" algn="l" defTabSz="533400">
+          <a:pPr lvl="0" algn="l" defTabSz="533400">
             <a:lnSpc>
               <a:spcPct val="90000"/>
             </a:lnSpc>
@@ -1873,7 +1921,6 @@
             <a:spcAft>
               <a:spcPct val="35000"/>
             </a:spcAft>
-            <a:buNone/>
           </a:pPr>
           <a:r>
             <a:rPr lang="en-US" sz="1200" kern="1200" dirty="0"/>
@@ -1923,7 +1970,7 @@
         </a:bodyPr>
         <a:lstStyle/>
         <a:p>
-          <a:pPr marL="0" lvl="0" indent="0" algn="l" defTabSz="400050">
+          <a:pPr lvl="0" algn="l" defTabSz="400050">
             <a:lnSpc>
               <a:spcPct val="90000"/>
             </a:lnSpc>
@@ -1933,7 +1980,6 @@
             <a:spcAft>
               <a:spcPct val="35000"/>
             </a:spcAft>
-            <a:buNone/>
           </a:pPr>
           <a:r>
             <a:rPr lang="en-US" sz="900" kern="1200" dirty="0"/>
@@ -2116,7 +2162,7 @@
         </a:prstGeom>
         <a:solidFill>
           <a:schemeClr val="accent4">
-            <a:hueOff val="4350797"/>
+            <a:hueOff val="4350798"/>
             <a:satOff val="-9429"/>
             <a:lumOff val="-4020"/>
             <a:alphaOff val="0"/>
@@ -2125,7 +2171,7 @@
         <a:ln w="10795" cap="flat" cmpd="sng" algn="ctr">
           <a:solidFill>
             <a:schemeClr val="accent4">
-              <a:hueOff val="4350797"/>
+              <a:hueOff val="4350798"/>
               <a:satOff val="-9429"/>
               <a:lumOff val="-4020"/>
               <a:alphaOff val="0"/>
@@ -2167,7 +2213,7 @@
         </a:prstGeom>
         <a:solidFill>
           <a:schemeClr val="accent4">
-            <a:hueOff val="4785877"/>
+            <a:hueOff val="4785878"/>
             <a:satOff val="-10371"/>
             <a:lumOff val="-4422"/>
             <a:alphaOff val="0"/>
@@ -2176,7 +2222,7 @@
         <a:ln w="10795" cap="flat" cmpd="sng" algn="ctr">
           <a:solidFill>
             <a:schemeClr val="accent4">
-              <a:hueOff val="4785877"/>
+              <a:hueOff val="4785878"/>
               <a:satOff val="-10371"/>
               <a:lumOff val="-4422"/>
               <a:alphaOff val="0"/>
@@ -2218,7 +2264,7 @@
         </a:prstGeom>
         <a:solidFill>
           <a:schemeClr val="accent4">
-            <a:hueOff val="5220957"/>
+            <a:hueOff val="5220958"/>
             <a:satOff val="-11314"/>
             <a:lumOff val="-4824"/>
             <a:alphaOff val="0"/>
@@ -2227,7 +2273,7 @@
         <a:ln w="10795" cap="flat" cmpd="sng" algn="ctr">
           <a:solidFill>
             <a:schemeClr val="accent4">
-              <a:hueOff val="5220957"/>
+              <a:hueOff val="5220958"/>
               <a:satOff val="-11314"/>
               <a:lumOff val="-4824"/>
               <a:alphaOff val="0"/>
@@ -2269,7 +2315,7 @@
         </a:prstGeom>
         <a:solidFill>
           <a:schemeClr val="accent4">
-            <a:hueOff val="5656036"/>
+            <a:hueOff val="5656037"/>
             <a:satOff val="-12257"/>
             <a:lumOff val="-5226"/>
             <a:alphaOff val="0"/>
@@ -2278,7 +2324,7 @@
         <a:ln w="10795" cap="flat" cmpd="sng" algn="ctr">
           <a:solidFill>
             <a:schemeClr val="accent4">
-              <a:hueOff val="5656036"/>
+              <a:hueOff val="5656037"/>
               <a:satOff val="-12257"/>
               <a:lumOff val="-5226"/>
               <a:alphaOff val="0"/>
@@ -2327,7 +2373,7 @@
         <a:ln w="10795" cap="flat" cmpd="sng" algn="ctr">
           <a:solidFill>
             <a:schemeClr val="accent4">
-              <a:hueOff val="4350797"/>
+              <a:hueOff val="4350798"/>
               <a:satOff val="-9429"/>
               <a:lumOff val="-4020"/>
               <a:alphaOff val="0"/>
@@ -2355,7 +2401,7 @@
         </a:bodyPr>
         <a:lstStyle/>
         <a:p>
-          <a:pPr marL="0" lvl="0" indent="0" algn="l" defTabSz="533400">
+          <a:pPr lvl="0" algn="l" defTabSz="533400">
             <a:lnSpc>
               <a:spcPct val="90000"/>
             </a:lnSpc>
@@ -2365,7 +2411,6 @@
             <a:spcAft>
               <a:spcPct val="35000"/>
             </a:spcAft>
-            <a:buNone/>
           </a:pPr>
           <a:r>
             <a:rPr lang="en-US" sz="1200" kern="1200" dirty="0"/>
@@ -2415,7 +2460,7 @@
         </a:bodyPr>
         <a:lstStyle/>
         <a:p>
-          <a:pPr marL="0" lvl="0" indent="0" algn="l" defTabSz="311150">
+          <a:pPr lvl="0" algn="l" defTabSz="311150">
             <a:lnSpc>
               <a:spcPct val="90000"/>
             </a:lnSpc>
@@ -2425,7 +2470,6 @@
             <a:spcAft>
               <a:spcPct val="35000"/>
             </a:spcAft>
-            <a:buNone/>
           </a:pPr>
           <a:r>
             <a:rPr lang="en-US" sz="700" kern="1200" dirty="0"/>
@@ -2455,7 +2499,7 @@
         </a:prstGeom>
         <a:solidFill>
           <a:schemeClr val="accent4">
-            <a:hueOff val="6091116"/>
+            <a:hueOff val="6091117"/>
             <a:satOff val="-13200"/>
             <a:lumOff val="-5628"/>
             <a:alphaOff val="0"/>
@@ -2464,7 +2508,7 @@
         <a:ln w="10795" cap="flat" cmpd="sng" algn="ctr">
           <a:solidFill>
             <a:schemeClr val="accent4">
-              <a:hueOff val="6091116"/>
+              <a:hueOff val="6091117"/>
               <a:satOff val="-13200"/>
               <a:lumOff val="-5628"/>
               <a:alphaOff val="0"/>
@@ -2506,7 +2550,7 @@
         </a:prstGeom>
         <a:solidFill>
           <a:schemeClr val="accent4">
-            <a:hueOff val="6526196"/>
+            <a:hueOff val="6526197"/>
             <a:satOff val="-14143"/>
             <a:lumOff val="-6030"/>
             <a:alphaOff val="0"/>
@@ -2515,7 +2559,7 @@
         <a:ln w="10795" cap="flat" cmpd="sng" algn="ctr">
           <a:solidFill>
             <a:schemeClr val="accent4">
-              <a:hueOff val="6526196"/>
+              <a:hueOff val="6526197"/>
               <a:satOff val="-14143"/>
               <a:lumOff val="-6030"/>
               <a:alphaOff val="0"/>
@@ -2557,7 +2601,7 @@
         </a:prstGeom>
         <a:solidFill>
           <a:schemeClr val="accent4">
-            <a:hueOff val="6961276"/>
+            <a:hueOff val="6961277"/>
             <a:satOff val="-15086"/>
             <a:lumOff val="-6432"/>
             <a:alphaOff val="0"/>
@@ -2566,7 +2610,7 @@
         <a:ln w="10795" cap="flat" cmpd="sng" algn="ctr">
           <a:solidFill>
             <a:schemeClr val="accent4">
-              <a:hueOff val="6961276"/>
+              <a:hueOff val="6961277"/>
               <a:satOff val="-15086"/>
               <a:lumOff val="-6432"/>
               <a:alphaOff val="0"/>
@@ -2608,7 +2652,7 @@
         </a:prstGeom>
         <a:solidFill>
           <a:schemeClr val="accent4">
-            <a:hueOff val="7396356"/>
+            <a:hueOff val="7396357"/>
             <a:satOff val="-16028"/>
             <a:lumOff val="-6834"/>
             <a:alphaOff val="0"/>
@@ -2617,7 +2661,7 @@
         <a:ln w="10795" cap="flat" cmpd="sng" algn="ctr">
           <a:solidFill>
             <a:schemeClr val="accent4">
-              <a:hueOff val="7396356"/>
+              <a:hueOff val="7396357"/>
               <a:satOff val="-16028"/>
               <a:lumOff val="-6834"/>
               <a:alphaOff val="0"/>
@@ -2710,7 +2754,7 @@
         </a:prstGeom>
         <a:solidFill>
           <a:schemeClr val="accent4">
-            <a:hueOff val="8266515"/>
+            <a:hueOff val="8266516"/>
             <a:satOff val="-17914"/>
             <a:lumOff val="-7638"/>
             <a:alphaOff val="0"/>
@@ -2719,7 +2763,7 @@
         <a:ln w="10795" cap="flat" cmpd="sng" algn="ctr">
           <a:solidFill>
             <a:schemeClr val="accent4">
-              <a:hueOff val="8266515"/>
+              <a:hueOff val="8266516"/>
               <a:satOff val="-17914"/>
               <a:lumOff val="-7638"/>
               <a:alphaOff val="0"/>
@@ -2761,7 +2805,7 @@
         </a:prstGeom>
         <a:solidFill>
           <a:schemeClr val="accent4">
-            <a:hueOff val="8701595"/>
+            <a:hueOff val="8701596"/>
             <a:satOff val="-18857"/>
             <a:lumOff val="-8040"/>
             <a:alphaOff val="0"/>
@@ -2770,7 +2814,7 @@
         <a:ln w="10795" cap="flat" cmpd="sng" algn="ctr">
           <a:solidFill>
             <a:schemeClr val="accent4">
-              <a:hueOff val="8701595"/>
+              <a:hueOff val="8701596"/>
               <a:satOff val="-18857"/>
               <a:lumOff val="-8040"/>
               <a:alphaOff val="0"/>
@@ -2819,7 +2863,7 @@
         <a:ln w="10795" cap="flat" cmpd="sng" algn="ctr">
           <a:solidFill>
             <a:schemeClr val="accent4">
-              <a:hueOff val="8701595"/>
+              <a:hueOff val="8701596"/>
               <a:satOff val="-18857"/>
               <a:lumOff val="-8040"/>
               <a:alphaOff val="0"/>
@@ -2847,7 +2891,7 @@
         </a:bodyPr>
         <a:lstStyle/>
         <a:p>
-          <a:pPr marL="0" lvl="0" indent="0" algn="l" defTabSz="533400">
+          <a:pPr lvl="0" algn="l" defTabSz="533400">
             <a:lnSpc>
               <a:spcPct val="90000"/>
             </a:lnSpc>
@@ -2857,7 +2901,6 @@
             <a:spcAft>
               <a:spcPct val="35000"/>
             </a:spcAft>
-            <a:buNone/>
           </a:pPr>
           <a:r>
             <a:rPr lang="en-US" sz="1200" kern="1200" dirty="0"/>
@@ -8715,7 +8758,7 @@
           <p:cNvPr id="12" name="Picture 11">
             <a:extLst>
               <a:ext uri="{FF2B5EF4-FFF2-40B4-BE49-F238E27FC236}">
-                <a16:creationId xmlns:a16="http://schemas.microsoft.com/office/drawing/2014/main" id="{24CF68A3-4510-4C32-AC6F-E4B9C0CB1A4D}"/>
+                <a16:creationId xmlns:a16="http://schemas.microsoft.com/office/drawing/2014/main" xmlns="" id="{24CF68A3-4510-4C32-AC6F-E4B9C0CB1A4D}"/>
               </a:ext>
             </a:extLst>
           </p:cNvPr>
@@ -8750,7 +8793,7 @@
           <p:cNvPr id="8" name="Picture 7">
             <a:extLst>
               <a:ext uri="{FF2B5EF4-FFF2-40B4-BE49-F238E27FC236}">
-                <a16:creationId xmlns:a16="http://schemas.microsoft.com/office/drawing/2014/main" id="{90AF301A-1C4C-4B57-9C60-24D773C66212}"/>
+                <a16:creationId xmlns:a16="http://schemas.microsoft.com/office/drawing/2014/main" xmlns="" id="{90AF301A-1C4C-4B57-9C60-24D773C66212}"/>
               </a:ext>
             </a:extLst>
           </p:cNvPr>
@@ -8780,7 +8823,7 @@
           <p:cNvPr id="13" name="TextBox 12">
             <a:extLst>
               <a:ext uri="{FF2B5EF4-FFF2-40B4-BE49-F238E27FC236}">
-                <a16:creationId xmlns:a16="http://schemas.microsoft.com/office/drawing/2014/main" id="{A92F64B1-02A1-4AE2-99EB-DF9154606833}"/>
+                <a16:creationId xmlns:a16="http://schemas.microsoft.com/office/drawing/2014/main" xmlns="" id="{A92F64B1-02A1-4AE2-99EB-DF9154606833}"/>
               </a:ext>
             </a:extLst>
           </p:cNvPr>
@@ -8911,7 +8954,7 @@
           <p:cNvPr id="14" name="TextBox 13">
             <a:extLst>
               <a:ext uri="{FF2B5EF4-FFF2-40B4-BE49-F238E27FC236}">
-                <a16:creationId xmlns:a16="http://schemas.microsoft.com/office/drawing/2014/main" id="{01C44DA4-7CA4-434F-B6DB-0E447C8B2D91}"/>
+                <a16:creationId xmlns:a16="http://schemas.microsoft.com/office/drawing/2014/main" xmlns="" id="{01C44DA4-7CA4-434F-B6DB-0E447C8B2D91}"/>
               </a:ext>
             </a:extLst>
           </p:cNvPr>
@@ -8947,7 +8990,7 @@
                 <a:hlinkClick r:id="rId4">
                   <a:extLst>
                     <a:ext uri="{A12FA001-AC4F-418D-AE19-62706E023703}">
-                      <ahyp:hlinkClr xmlns:ahyp="http://schemas.microsoft.com/office/drawing/2018/hyperlinkcolor" val="tx"/>
+                      <ahyp:hlinkClr xmlns:ahyp="http://schemas.microsoft.com/office/drawing/2018/hyperlinkcolor" xmlns="" val="tx"/>
                     </a:ext>
                   </a:extLst>
                 </a:hlinkClick>
@@ -8972,6 +9015,13 @@
   <p:clrMapOvr>
     <a:masterClrMapping/>
   </p:clrMapOvr>
+  <p:timing>
+    <p:tnLst>
+      <p:par>
+        <p:cTn id="1" dur="indefinite" restart="never" nodeType="tmRoot"/>
+      </p:par>
+    </p:tnLst>
+  </p:timing>
 </p:sld>
 </file>
 
@@ -8997,7 +9047,7 @@
           <p:cNvPr id="2" name="Title 1">
             <a:extLst>
               <a:ext uri="{FF2B5EF4-FFF2-40B4-BE49-F238E27FC236}">
-                <a16:creationId xmlns:a16="http://schemas.microsoft.com/office/drawing/2014/main" id="{8111F0B3-66D6-43F7-ACBD-A1320C655EE6}"/>
+                <a16:creationId xmlns:a16="http://schemas.microsoft.com/office/drawing/2014/main" xmlns="" id="{8111F0B3-66D6-43F7-ACBD-A1320C655EE6}"/>
               </a:ext>
             </a:extLst>
           </p:cNvPr>
@@ -9037,7 +9087,7 @@
           <p:cNvPr id="3" name="Content Placeholder 2">
             <a:extLst>
               <a:ext uri="{FF2B5EF4-FFF2-40B4-BE49-F238E27FC236}">
-                <a16:creationId xmlns:a16="http://schemas.microsoft.com/office/drawing/2014/main" id="{41D11086-9659-498F-9582-2BAE6C3D5582}"/>
+                <a16:creationId xmlns:a16="http://schemas.microsoft.com/office/drawing/2014/main" xmlns="" id="{41D11086-9659-498F-9582-2BAE6C3D5582}"/>
               </a:ext>
             </a:extLst>
           </p:cNvPr>
@@ -9055,13 +9105,36 @@
           </a:xfrm>
         </p:spPr>
         <p:txBody>
-          <a:bodyPr/>
+          <a:bodyPr>
+            <a:normAutofit/>
+          </a:bodyPr>
           <a:lstStyle/>
           <a:p>
             <a:r>
-              <a:rPr lang="en-US" dirty="0"/>
-              <a:t>Spark Structured Streaming and Bool values</a:t>
-            </a:r>
+              <a:rPr lang="en-US" sz="2800" dirty="0"/>
+              <a:t>Spark Structured Streaming and </a:t>
+            </a:r>
+            <a:r>
+              <a:rPr lang="en-US" sz="2800" dirty="0" err="1"/>
+              <a:t>Bool</a:t>
+            </a:r>
+            <a:r>
+              <a:rPr lang="en-US" sz="2800" dirty="0"/>
+              <a:t> </a:t>
+            </a:r>
+            <a:r>
+              <a:rPr lang="en-US" sz="2800" dirty="0" smtClean="0"/>
+              <a:t>values</a:t>
+            </a:r>
+          </a:p>
+          <a:p>
+            <a:endParaRPr lang="en-US" sz="2800" dirty="0"/>
+          </a:p>
+          <a:p>
+            <a:endParaRPr lang="en-US" sz="2800" dirty="0" smtClean="0"/>
+          </a:p>
+          <a:p>
+            <a:endParaRPr lang="en-US" sz="2800" dirty="0"/>
           </a:p>
         </p:txBody>
       </p:sp>
@@ -9070,7 +9143,7 @@
           <p:cNvPr id="4" name="Picture 3">
             <a:extLst>
               <a:ext uri="{FF2B5EF4-FFF2-40B4-BE49-F238E27FC236}">
-                <a16:creationId xmlns:a16="http://schemas.microsoft.com/office/drawing/2014/main" id="{AC731C35-0B23-4E8E-AE8C-CEF165666035}"/>
+                <a16:creationId xmlns:a16="http://schemas.microsoft.com/office/drawing/2014/main" xmlns="" id="{AC731C35-0B23-4E8E-AE8C-CEF165666035}"/>
               </a:ext>
             </a:extLst>
           </p:cNvPr>
@@ -9087,7 +9160,7 @@
         </p:blipFill>
         <p:spPr>
           <a:xfrm>
-            <a:off x="3933523" y="3686888"/>
+            <a:off x="3933523" y="3112912"/>
             <a:ext cx="7528990" cy="945270"/>
           </a:xfrm>
           <a:prstGeom prst="rect">
@@ -9357,7 +9430,7 @@
           <p:cNvPr id="2" name="Title 1">
             <a:extLst>
               <a:ext uri="{FF2B5EF4-FFF2-40B4-BE49-F238E27FC236}">
-                <a16:creationId xmlns:a16="http://schemas.microsoft.com/office/drawing/2014/main" id="{8111F0B3-66D6-43F7-ACBD-A1320C655EE6}"/>
+                <a16:creationId xmlns:a16="http://schemas.microsoft.com/office/drawing/2014/main" xmlns="" id="{8111F0B3-66D6-43F7-ACBD-A1320C655EE6}"/>
               </a:ext>
             </a:extLst>
           </p:cNvPr>
@@ -9397,7 +9470,7 @@
           <p:cNvPr id="3" name="Content Placeholder 2">
             <a:extLst>
               <a:ext uri="{FF2B5EF4-FFF2-40B4-BE49-F238E27FC236}">
-                <a16:creationId xmlns:a16="http://schemas.microsoft.com/office/drawing/2014/main" id="{41D11086-9659-498F-9582-2BAE6C3D5582}"/>
+                <a16:creationId xmlns:a16="http://schemas.microsoft.com/office/drawing/2014/main" xmlns="" id="{41D11086-9659-498F-9582-2BAE6C3D5582}"/>
               </a:ext>
             </a:extLst>
           </p:cNvPr>
@@ -9415,60 +9488,74 @@
           </a:xfrm>
         </p:spPr>
         <p:txBody>
-          <a:bodyPr/>
+          <a:bodyPr>
+            <a:normAutofit/>
+          </a:bodyPr>
           <a:lstStyle/>
           <a:p>
             <a:r>
-              <a:rPr lang="en-US" dirty="0"/>
+              <a:rPr lang="en-US" sz="2800" dirty="0"/>
               <a:t>Each record -&gt; </a:t>
             </a:r>
             <a:r>
-              <a:rPr lang="en-US" dirty="0" err="1"/>
+              <a:rPr lang="en-US" sz="2800" dirty="0" err="1"/>
               <a:t>kafka</a:t>
             </a:r>
             <a:r>
-              <a:rPr lang="en-US" dirty="0"/>
+              <a:rPr lang="en-US" sz="2800" dirty="0"/>
               <a:t> message vs batch of records -&gt; </a:t>
             </a:r>
             <a:r>
-              <a:rPr lang="en-US" dirty="0" err="1"/>
+              <a:rPr lang="en-US" sz="2800" dirty="0" err="1"/>
               <a:t>kafka</a:t>
             </a:r>
             <a:r>
-              <a:rPr lang="en-US" dirty="0"/>
+              <a:rPr lang="en-US" sz="2800" dirty="0"/>
               <a:t> message</a:t>
             </a:r>
           </a:p>
           <a:p>
             <a:pPr lvl="1"/>
             <a:r>
-              <a:rPr lang="en-US" dirty="0"/>
+              <a:rPr lang="en-US" sz="2400" dirty="0"/>
               <a:t>Or array of JSONs to </a:t>
             </a:r>
             <a:r>
-              <a:rPr lang="en-US" dirty="0" err="1"/>
+              <a:rPr lang="en-US" sz="2400" dirty="0" err="1"/>
               <a:t>DataFrame</a:t>
             </a:r>
             <a:r>
-              <a:rPr lang="en-US" dirty="0"/>
-              <a:t> and back to array of JSONs</a:t>
+              <a:rPr lang="en-US" sz="2400" dirty="0"/>
+              <a:t> and back to array of </a:t>
+            </a:r>
+            <a:r>
+              <a:rPr lang="en-US" sz="2400" dirty="0" smtClean="0"/>
+              <a:t>JSONs</a:t>
             </a:r>
           </a:p>
           <a:p>
             <a:pPr lvl="1"/>
-            <a:endParaRPr lang="en-US" dirty="0"/>
+            <a:endParaRPr lang="en-US" sz="2400" dirty="0"/>
           </a:p>
           <a:p>
             <a:pPr lvl="1"/>
-            <a:endParaRPr lang="en-US" dirty="0"/>
+            <a:endParaRPr lang="en-US" sz="2400" dirty="0"/>
           </a:p>
           <a:p>
             <a:pPr lvl="1"/>
-            <a:endParaRPr lang="en-US" dirty="0"/>
+            <a:endParaRPr lang="en-US" sz="2400" dirty="0"/>
           </a:p>
           <a:p>
             <a:pPr lvl="1"/>
-            <a:endParaRPr lang="en-US" dirty="0"/>
+            <a:endParaRPr lang="en-US" sz="2400" dirty="0"/>
+          </a:p>
+          <a:p>
+            <a:pPr lvl="1"/>
+            <a:endParaRPr lang="en-US" sz="2400" dirty="0"/>
+          </a:p>
+          <a:p>
+            <a:pPr lvl="1"/>
+            <a:endParaRPr lang="en-US" sz="2400" dirty="0"/>
           </a:p>
         </p:txBody>
       </p:sp>
@@ -9477,7 +9564,7 @@
           <p:cNvPr id="5" name="Picture 4">
             <a:extLst>
               <a:ext uri="{FF2B5EF4-FFF2-40B4-BE49-F238E27FC236}">
-                <a16:creationId xmlns:a16="http://schemas.microsoft.com/office/drawing/2014/main" id="{202A85A3-C292-4955-8E35-05C0B5EB2DAF}"/>
+                <a16:creationId xmlns:a16="http://schemas.microsoft.com/office/drawing/2014/main" xmlns="" id="{202A85A3-C292-4955-8E35-05C0B5EB2DAF}"/>
               </a:ext>
             </a:extLst>
           </p:cNvPr>
@@ -9849,7 +9936,7 @@
           <p:cNvPr id="2" name="Title 1">
             <a:extLst>
               <a:ext uri="{FF2B5EF4-FFF2-40B4-BE49-F238E27FC236}">
-                <a16:creationId xmlns:a16="http://schemas.microsoft.com/office/drawing/2014/main" id="{C2F14E47-E6DF-440F-B89E-071CE946C4CA}"/>
+                <a16:creationId xmlns:a16="http://schemas.microsoft.com/office/drawing/2014/main" xmlns="" id="{C2F14E47-E6DF-440F-B89E-071CE946C4CA}"/>
               </a:ext>
             </a:extLst>
           </p:cNvPr>
@@ -9881,7 +9968,7 @@
           <p:cNvPr id="3" name="Content Placeholder 2">
             <a:extLst>
               <a:ext uri="{FF2B5EF4-FFF2-40B4-BE49-F238E27FC236}">
-                <a16:creationId xmlns:a16="http://schemas.microsoft.com/office/drawing/2014/main" id="{01F476F0-2E4E-46F1-B66E-ED151E8ED327}"/>
+                <a16:creationId xmlns:a16="http://schemas.microsoft.com/office/drawing/2014/main" xmlns="" id="{01F476F0-2E4E-46F1-B66E-ED151E8ED327}"/>
               </a:ext>
             </a:extLst>
           </p:cNvPr>
@@ -9892,74 +9979,81 @@
             <p:ph idx="1"/>
           </p:nvPr>
         </p:nvSpPr>
-        <p:spPr/>
+        <p:spPr>
+          <a:xfrm>
+            <a:off x="3601615" y="864108"/>
+            <a:ext cx="8080312" cy="5120640"/>
+          </a:xfrm>
+        </p:spPr>
         <p:txBody>
-          <a:bodyPr/>
+          <a:bodyPr>
+            <a:normAutofit/>
+          </a:bodyPr>
           <a:lstStyle/>
           <a:p>
             <a:pPr algn="r" rtl="1"/>
             <a:r>
-              <a:rPr lang="he-IL" dirty="0"/>
+              <a:rPr lang="he-IL" sz="2400" dirty="0"/>
               <a:t>איסוף מידע על תנועות טיסות בינלאומיות</a:t>
             </a:r>
           </a:p>
           <a:p>
             <a:pPr algn="r" rtl="1"/>
             <a:r>
-              <a:rPr lang="he-IL" dirty="0"/>
+              <a:rPr lang="he-IL" sz="2400" dirty="0"/>
               <a:t>שמירת המידע לטובת ניתוחים עתידיים</a:t>
             </a:r>
           </a:p>
           <a:p>
             <a:pPr algn="r" rtl="1"/>
             <a:r>
-              <a:rPr lang="he-IL" dirty="0"/>
+              <a:rPr lang="he-IL" sz="2400" dirty="0"/>
               <a:t>הנגשת המידע לניתוחים מיידים, ב </a:t>
             </a:r>
             <a:r>
-              <a:rPr lang="en-US" dirty="0"/>
+              <a:rPr lang="en-US" sz="2400" dirty="0"/>
               <a:t>Impala</a:t>
             </a:r>
             <a:r>
-              <a:rPr lang="he-IL" dirty="0"/>
+              <a:rPr lang="he-IL" sz="2400" dirty="0"/>
               <a:t>, ברמה יומית / שעתית</a:t>
             </a:r>
           </a:p>
           <a:p>
             <a:pPr algn="r" rtl="1"/>
             <a:r>
-              <a:rPr lang="he-IL" dirty="0"/>
+              <a:rPr lang="he-IL" sz="2400" dirty="0"/>
               <a:t>העשרת המידע הגיאוגרפי, במידע לגבי אזור הטיסה: ארץ / עיר</a:t>
             </a:r>
           </a:p>
           <a:p>
             <a:pPr algn="r" rtl="1"/>
             <a:r>
-              <a:rPr lang="he-IL" dirty="0"/>
+              <a:rPr lang="he-IL" sz="2400" dirty="0"/>
               <a:t>הצגת מסלולים ומפות חום</a:t>
             </a:r>
           </a:p>
           <a:p>
             <a:pPr algn="r" rtl="1"/>
             <a:r>
-              <a:rPr lang="he-IL" dirty="0"/>
+              <a:rPr lang="he-IL" sz="2400" dirty="0"/>
               <a:t>מתן התראות על חריגות:</a:t>
             </a:r>
           </a:p>
           <a:p>
             <a:pPr lvl="1" algn="r" rtl="1"/>
             <a:r>
-              <a:rPr lang="he-IL" dirty="0"/>
+              <a:rPr lang="he-IL" sz="2400" dirty="0"/>
               <a:t>זע"ט בעייתי</a:t>
             </a:r>
           </a:p>
           <a:p>
             <a:pPr lvl="1" algn="r" rtl="1"/>
             <a:r>
-              <a:rPr lang="he-IL" dirty="0"/>
+              <a:rPr lang="he-IL" sz="2400" dirty="0"/>
               <a:t>טיסה שחודרת למרחב של מדינה מסוימת</a:t>
             </a:r>
-            <a:endParaRPr lang="en-US" dirty="0"/>
+            <a:endParaRPr lang="en-US" sz="2400" dirty="0"/>
           </a:p>
         </p:txBody>
       </p:sp>
@@ -9973,6 +10067,13 @@
   <p:clrMapOvr>
     <a:masterClrMapping/>
   </p:clrMapOvr>
+  <p:timing>
+    <p:tnLst>
+      <p:par>
+        <p:cTn id="1" dur="indefinite" restart="never" nodeType="tmRoot"/>
+      </p:par>
+    </p:tnLst>
+  </p:timing>
 </p:sld>
 </file>
 
@@ -10031,8 +10132,8 @@
         </p:nvSpPr>
         <p:spPr>
           <a:xfrm>
-            <a:off x="3581400" y="1645433"/>
-            <a:ext cx="3761232" cy="3567130"/>
+            <a:off x="3581400" y="1520784"/>
+            <a:ext cx="4032380" cy="3816429"/>
           </a:xfrm>
           <a:prstGeom prst="rect">
             <a:avLst/>
@@ -10045,7 +10146,7 @@
           <a:lstStyle/>
           <a:p>
             <a:r>
-              <a:rPr lang="en-US" sz="1800" dirty="0">
+              <a:rPr lang="en-US" dirty="0">
                 <a:solidFill>
                   <a:schemeClr val="accent2">
                     <a:lumMod val="75000"/>
@@ -10055,13 +10156,13 @@
               <a:t>icao24</a:t>
             </a:r>
             <a:r>
-              <a:rPr lang="en-US" sz="1800" dirty="0"/>
+              <a:rPr lang="en-US" dirty="0"/>
               <a:t> - Mode-s Unique identifier</a:t>
             </a:r>
           </a:p>
           <a:p>
             <a:r>
-              <a:rPr lang="en-US" sz="1800" dirty="0">
+              <a:rPr lang="en-US" dirty="0">
                 <a:solidFill>
                   <a:schemeClr val="accent2">
                     <a:lumMod val="75000"/>
@@ -10071,13 +10172,13 @@
               <a:t>callsign</a:t>
             </a:r>
             <a:r>
-              <a:rPr lang="en-US" sz="1800" dirty="0"/>
+              <a:rPr lang="en-US" dirty="0"/>
               <a:t> - Identifies a specific flight</a:t>
             </a:r>
           </a:p>
           <a:p>
             <a:r>
-              <a:rPr lang="en-US" sz="1800" dirty="0">
+              <a:rPr lang="en-US" dirty="0">
                 <a:solidFill>
                   <a:schemeClr val="accent2">
                     <a:lumMod val="75000"/>
@@ -10087,13 +10188,13 @@
               <a:t>longitude</a:t>
             </a:r>
             <a:r>
-              <a:rPr lang="en-US" sz="1800" dirty="0"/>
+              <a:rPr lang="en-US" dirty="0"/>
               <a:t> - WGS-84</a:t>
             </a:r>
           </a:p>
           <a:p>
             <a:r>
-              <a:rPr lang="en-US" sz="1800" dirty="0">
+              <a:rPr lang="en-US" dirty="0">
                 <a:solidFill>
                   <a:schemeClr val="accent2">
                     <a:lumMod val="75000"/>
@@ -10103,13 +10204,13 @@
               <a:t>latitude</a:t>
             </a:r>
             <a:r>
-              <a:rPr lang="en-US" sz="1800" dirty="0"/>
+              <a:rPr lang="en-US" dirty="0"/>
               <a:t> - WGS-84</a:t>
             </a:r>
           </a:p>
           <a:p>
             <a:r>
-              <a:rPr lang="en-US" sz="1800" dirty="0" err="1">
+              <a:rPr lang="en-US" dirty="0" err="1">
                 <a:solidFill>
                   <a:schemeClr val="accent2">
                     <a:lumMod val="75000"/>
@@ -10119,13 +10220,13 @@
               <a:t>geo_altitude</a:t>
             </a:r>
             <a:r>
-              <a:rPr lang="en-US" sz="1800" dirty="0"/>
+              <a:rPr lang="en-US" dirty="0"/>
               <a:t> - AGL in meters</a:t>
             </a:r>
           </a:p>
           <a:p>
             <a:r>
-              <a:rPr lang="en-US" sz="1800" dirty="0" err="1">
+              <a:rPr lang="en-US" dirty="0" err="1">
                 <a:solidFill>
                   <a:schemeClr val="accent2">
                     <a:lumMod val="75000"/>
@@ -10135,7 +10236,7 @@
               <a:t>baro_altitude</a:t>
             </a:r>
             <a:r>
-              <a:rPr lang="en-US" sz="1800" dirty="0">
+              <a:rPr lang="en-US" dirty="0">
                 <a:solidFill>
                   <a:schemeClr val="accent2">
                     <a:lumMod val="75000"/>
@@ -10145,13 +10246,13 @@
               <a:t> </a:t>
             </a:r>
             <a:r>
-              <a:rPr lang="en-US" sz="1800" dirty="0"/>
+              <a:rPr lang="en-US" dirty="0"/>
               <a:t>- ASL in meters</a:t>
             </a:r>
           </a:p>
           <a:p>
             <a:r>
-              <a:rPr lang="en-US" sz="1800" dirty="0">
+              <a:rPr lang="en-US" dirty="0">
                 <a:solidFill>
                   <a:schemeClr val="accent2">
                     <a:lumMod val="75000"/>
@@ -10161,13 +10262,13 @@
               <a:t>squawk</a:t>
             </a:r>
             <a:r>
-              <a:rPr lang="en-US" sz="1800" dirty="0"/>
+              <a:rPr lang="en-US" dirty="0"/>
               <a:t> - transponder code</a:t>
             </a:r>
           </a:p>
           <a:p>
             <a:r>
-              <a:rPr lang="en-US" sz="1800" dirty="0" err="1">
+              <a:rPr lang="en-US" dirty="0" err="1">
                 <a:solidFill>
                   <a:schemeClr val="accent2">
                     <a:lumMod val="75000"/>
@@ -10177,7 +10278,7 @@
               <a:t>on_ground</a:t>
             </a:r>
             <a:r>
-              <a:rPr lang="en-US" sz="1800" dirty="0">
+              <a:rPr lang="en-US" dirty="0">
                 <a:solidFill>
                   <a:schemeClr val="accent2">
                     <a:lumMod val="75000"/>
@@ -10187,13 +10288,13 @@
               <a:t> </a:t>
             </a:r>
             <a:r>
-              <a:rPr lang="en-US" sz="1800" dirty="0"/>
+              <a:rPr lang="en-US" dirty="0"/>
               <a:t>– true / false</a:t>
             </a:r>
           </a:p>
           <a:p>
             <a:r>
-              <a:rPr lang="en-US" sz="1800" dirty="0">
+              <a:rPr lang="en-US" dirty="0">
                 <a:solidFill>
                   <a:schemeClr val="accent2">
                     <a:lumMod val="75000"/>
@@ -10203,7 +10304,7 @@
               <a:t>velocity</a:t>
             </a:r>
             <a:r>
-              <a:rPr lang="en-US" sz="1800" dirty="0"/>
+              <a:rPr lang="en-US" dirty="0"/>
               <a:t> - over ground in m/s. </a:t>
             </a:r>
           </a:p>
@@ -10214,7 +10315,7 @@
           <p:cNvPr id="3" name="Content Placeholder 2">
             <a:extLst>
               <a:ext uri="{FF2B5EF4-FFF2-40B4-BE49-F238E27FC236}">
-                <a16:creationId xmlns:a16="http://schemas.microsoft.com/office/drawing/2014/main" id="{11BA08A7-7F9C-4BE3-A10E-2051315C045E}"/>
+                <a16:creationId xmlns:a16="http://schemas.microsoft.com/office/drawing/2014/main" xmlns="" id="{11BA08A7-7F9C-4BE3-A10E-2051315C045E}"/>
               </a:ext>
             </a:extLst>
           </p:cNvPr>
@@ -10227,7 +10328,7 @@
         </p:nvSpPr>
         <p:spPr>
           <a:xfrm>
-            <a:off x="7543800" y="868680"/>
+            <a:off x="7637105" y="868680"/>
             <a:ext cx="3928872" cy="5120640"/>
           </a:xfrm>
         </p:spPr>
@@ -10239,32 +10340,32 @@
           <a:p>
             <a:pPr algn="r" rtl="1"/>
             <a:r>
-              <a:rPr lang="he-IL" dirty="0"/>
+              <a:rPr lang="he-IL" sz="2400" dirty="0"/>
               <a:t>מיקומי מטוסים בעולם ע"ב רשת מקלטים ציבורית</a:t>
             </a:r>
           </a:p>
           <a:p>
             <a:pPr algn="r" rtl="1"/>
             <a:r>
-              <a:rPr lang="he-IL" dirty="0"/>
+              <a:rPr lang="he-IL" sz="2400" dirty="0"/>
               <a:t>שימוש ב </a:t>
             </a:r>
             <a:r>
-              <a:rPr lang="en-GB" dirty="0"/>
+              <a:rPr lang="en-GB" sz="2400" dirty="0"/>
               <a:t>python API</a:t>
             </a:r>
             <a:r>
-              <a:rPr lang="he-IL" dirty="0"/>
+              <a:rPr lang="he-IL" sz="2400" dirty="0"/>
               <a:t> קיים של האתר</a:t>
             </a:r>
           </a:p>
           <a:p>
             <a:pPr algn="r" rtl="1"/>
             <a:r>
-              <a:rPr lang="he-IL" dirty="0"/>
+              <a:rPr lang="he-IL" sz="2400" dirty="0"/>
               <a:t>פעם ב-10 שניות מקבלים רשימת כלל המיקומים (~6000)</a:t>
             </a:r>
-            <a:endParaRPr lang="en-US" dirty="0"/>
+            <a:endParaRPr lang="en-US" sz="2400" dirty="0"/>
           </a:p>
         </p:txBody>
       </p:sp>
@@ -10278,6 +10379,13 @@
   <p:clrMapOvr>
     <a:masterClrMapping/>
   </p:clrMapOvr>
+  <p:timing>
+    <p:tnLst>
+      <p:par>
+        <p:cTn id="1" dur="indefinite" restart="never" nodeType="tmRoot"/>
+      </p:par>
+    </p:tnLst>
+  </p:timing>
 </p:sld>
 </file>
 
@@ -10676,7 +10784,7 @@
                 <a:hlinkClick r:id="rId2">
                   <a:extLst>
                     <a:ext uri="{A12FA001-AC4F-418D-AE19-62706E023703}">
-                      <ahyp:hlinkClr xmlns:ahyp="http://schemas.microsoft.com/office/drawing/2018/hyperlinkcolor" val="tx"/>
+                      <ahyp:hlinkClr xmlns:ahyp="http://schemas.microsoft.com/office/drawing/2018/hyperlinkcolor" xmlns="" val="tx"/>
                     </a:ext>
                   </a:extLst>
                 </a:hlinkClick>
@@ -11410,7 +11518,7 @@
           <p:cNvPr id="27" name="Group 26">
             <a:extLst>
               <a:ext uri="{FF2B5EF4-FFF2-40B4-BE49-F238E27FC236}">
-                <a16:creationId xmlns:a16="http://schemas.microsoft.com/office/drawing/2014/main" id="{9172F1AC-F96B-460C-AC96-87C6E28096CC}"/>
+                <a16:creationId xmlns:a16="http://schemas.microsoft.com/office/drawing/2014/main" xmlns="" id="{9172F1AC-F96B-460C-AC96-87C6E28096CC}"/>
               </a:ext>
             </a:extLst>
           </p:cNvPr>
@@ -11511,7 +11619,7 @@
           <p:cNvPr id="28" name="Group 27">
             <a:extLst>
               <a:ext uri="{FF2B5EF4-FFF2-40B4-BE49-F238E27FC236}">
-                <a16:creationId xmlns:a16="http://schemas.microsoft.com/office/drawing/2014/main" id="{3FCD394B-1F08-4A4D-9C36-79A240BF3680}"/>
+                <a16:creationId xmlns:a16="http://schemas.microsoft.com/office/drawing/2014/main" xmlns="" id="{3FCD394B-1F08-4A4D-9C36-79A240BF3680}"/>
               </a:ext>
             </a:extLst>
           </p:cNvPr>
@@ -11703,7 +11811,7 @@
           <p:cNvPr id="29" name="Group 28">
             <a:extLst>
               <a:ext uri="{FF2B5EF4-FFF2-40B4-BE49-F238E27FC236}">
-                <a16:creationId xmlns:a16="http://schemas.microsoft.com/office/drawing/2014/main" id="{8E2975AE-0A4C-4550-BA24-7C8D9F860747}"/>
+                <a16:creationId xmlns:a16="http://schemas.microsoft.com/office/drawing/2014/main" xmlns="" id="{8E2975AE-0A4C-4550-BA24-7C8D9F860747}"/>
               </a:ext>
             </a:extLst>
           </p:cNvPr>
@@ -12125,7 +12233,7 @@
           <p:cNvPr id="8" name="Group 7">
             <a:extLst>
               <a:ext uri="{FF2B5EF4-FFF2-40B4-BE49-F238E27FC236}">
-                <a16:creationId xmlns:a16="http://schemas.microsoft.com/office/drawing/2014/main" id="{D6D197CF-E340-436F-B33D-204319DF07C9}"/>
+                <a16:creationId xmlns:a16="http://schemas.microsoft.com/office/drawing/2014/main" xmlns="" id="{D6D197CF-E340-436F-B33D-204319DF07C9}"/>
               </a:ext>
             </a:extLst>
           </p:cNvPr>
@@ -12222,7 +12330,7 @@
           <p:cNvPr id="9" name="Group 8">
             <a:extLst>
               <a:ext uri="{FF2B5EF4-FFF2-40B4-BE49-F238E27FC236}">
-                <a16:creationId xmlns:a16="http://schemas.microsoft.com/office/drawing/2014/main" id="{4E7D03C2-6A41-4DCB-A2F0-CFAA6A739770}"/>
+                <a16:creationId xmlns:a16="http://schemas.microsoft.com/office/drawing/2014/main" xmlns="" id="{4E7D03C2-6A41-4DCB-A2F0-CFAA6A739770}"/>
               </a:ext>
             </a:extLst>
           </p:cNvPr>
@@ -12319,7 +12427,7 @@
           <p:cNvPr id="58" name="Can 174">
             <a:extLst>
               <a:ext uri="{FF2B5EF4-FFF2-40B4-BE49-F238E27FC236}">
-                <a16:creationId xmlns:a16="http://schemas.microsoft.com/office/drawing/2014/main" id="{6E0E7B62-B53C-4B7A-A76A-65E9B37249A6}"/>
+                <a16:creationId xmlns:a16="http://schemas.microsoft.com/office/drawing/2014/main" xmlns="" id="{6E0E7B62-B53C-4B7A-A76A-65E9B37249A6}"/>
               </a:ext>
             </a:extLst>
           </p:cNvPr>
@@ -12368,7 +12476,7 @@
           <p:cNvPr id="65" name="Straight Arrow Connector 64">
             <a:extLst>
               <a:ext uri="{FF2B5EF4-FFF2-40B4-BE49-F238E27FC236}">
-                <a16:creationId xmlns:a16="http://schemas.microsoft.com/office/drawing/2014/main" id="{542EE611-E0E4-4BD6-A15A-2A72E7FEFF0C}"/>
+                <a16:creationId xmlns:a16="http://schemas.microsoft.com/office/drawing/2014/main" xmlns="" id="{542EE611-E0E4-4BD6-A15A-2A72E7FEFF0C}"/>
               </a:ext>
             </a:extLst>
           </p:cNvPr>
@@ -12411,7 +12519,7 @@
           <p:cNvPr id="84" name="Rectangle 83">
             <a:extLst>
               <a:ext uri="{FF2B5EF4-FFF2-40B4-BE49-F238E27FC236}">
-                <a16:creationId xmlns:a16="http://schemas.microsoft.com/office/drawing/2014/main" id="{04372222-D016-4491-8D21-1968454150B0}"/>
+                <a16:creationId xmlns:a16="http://schemas.microsoft.com/office/drawing/2014/main" xmlns="" id="{04372222-D016-4491-8D21-1968454150B0}"/>
               </a:ext>
             </a:extLst>
           </p:cNvPr>
@@ -12459,7 +12567,7 @@
           <p:cNvPr id="85" name="Straight Arrow Connector 84">
             <a:extLst>
               <a:ext uri="{FF2B5EF4-FFF2-40B4-BE49-F238E27FC236}">
-                <a16:creationId xmlns:a16="http://schemas.microsoft.com/office/drawing/2014/main" id="{325DF21A-410E-47C9-8E6C-8CC79B6E2272}"/>
+                <a16:creationId xmlns:a16="http://schemas.microsoft.com/office/drawing/2014/main" xmlns="" id="{325DF21A-410E-47C9-8E6C-8CC79B6E2272}"/>
               </a:ext>
             </a:extLst>
           </p:cNvPr>
@@ -12502,7 +12610,7 @@
           <p:cNvPr id="98" name="Straight Arrow Connector 97">
             <a:extLst>
               <a:ext uri="{FF2B5EF4-FFF2-40B4-BE49-F238E27FC236}">
-                <a16:creationId xmlns:a16="http://schemas.microsoft.com/office/drawing/2014/main" id="{35198864-0BB5-4840-8D4D-2F195C3505DA}"/>
+                <a16:creationId xmlns:a16="http://schemas.microsoft.com/office/drawing/2014/main" xmlns="" id="{35198864-0BB5-4840-8D4D-2F195C3505DA}"/>
               </a:ext>
             </a:extLst>
           </p:cNvPr>
@@ -12546,7 +12654,7 @@
           <p:cNvPr id="101" name="Straight Arrow Connector 100">
             <a:extLst>
               <a:ext uri="{FF2B5EF4-FFF2-40B4-BE49-F238E27FC236}">
-                <a16:creationId xmlns:a16="http://schemas.microsoft.com/office/drawing/2014/main" id="{55B87AB1-A514-4195-AB3A-DE3A949746B8}"/>
+                <a16:creationId xmlns:a16="http://schemas.microsoft.com/office/drawing/2014/main" xmlns="" id="{55B87AB1-A514-4195-AB3A-DE3A949746B8}"/>
               </a:ext>
             </a:extLst>
           </p:cNvPr>
@@ -15387,7 +15495,7 @@
           <p:cNvPr id="12" name="Group 11">
             <a:extLst>
               <a:ext uri="{FF2B5EF4-FFF2-40B4-BE49-F238E27FC236}">
-                <a16:creationId xmlns:a16="http://schemas.microsoft.com/office/drawing/2014/main" id="{3B95F924-7B25-4FA2-A171-F61A1E87E649}"/>
+                <a16:creationId xmlns:a16="http://schemas.microsoft.com/office/drawing/2014/main" xmlns="" id="{3B95F924-7B25-4FA2-A171-F61A1E87E649}"/>
               </a:ext>
             </a:extLst>
           </p:cNvPr>
@@ -15407,7 +15515,7 @@
             <p:cNvPr id="2" name="Picture 1">
               <a:extLst>
                 <a:ext uri="{FF2B5EF4-FFF2-40B4-BE49-F238E27FC236}">
-                  <a16:creationId xmlns:a16="http://schemas.microsoft.com/office/drawing/2014/main" id="{E09438F6-ACD5-402E-AB6C-43B570CEE35B}"/>
+                  <a16:creationId xmlns:a16="http://schemas.microsoft.com/office/drawing/2014/main" xmlns="" id="{E09438F6-ACD5-402E-AB6C-43B570CEE35B}"/>
                 </a:ext>
               </a:extLst>
             </p:cNvPr>
@@ -15437,7 +15545,7 @@
             <p:cNvPr id="4" name="TextBox 3">
               <a:extLst>
                 <a:ext uri="{FF2B5EF4-FFF2-40B4-BE49-F238E27FC236}">
-                  <a16:creationId xmlns:a16="http://schemas.microsoft.com/office/drawing/2014/main" id="{61AF307B-3728-49E0-BED9-8957ED672E29}"/>
+                  <a16:creationId xmlns:a16="http://schemas.microsoft.com/office/drawing/2014/main" xmlns="" id="{61AF307B-3728-49E0-BED9-8957ED672E29}"/>
                 </a:ext>
               </a:extLst>
             </p:cNvPr>
@@ -15474,7 +15582,7 @@
           <p:cNvPr id="13" name="Group 12">
             <a:extLst>
               <a:ext uri="{FF2B5EF4-FFF2-40B4-BE49-F238E27FC236}">
-                <a16:creationId xmlns:a16="http://schemas.microsoft.com/office/drawing/2014/main" id="{9AA9F9BF-919E-4BA4-8E8A-33ACA0E06915}"/>
+                <a16:creationId xmlns:a16="http://schemas.microsoft.com/office/drawing/2014/main" xmlns="" id="{9AA9F9BF-919E-4BA4-8E8A-33ACA0E06915}"/>
               </a:ext>
             </a:extLst>
           </p:cNvPr>
@@ -15494,7 +15602,7 @@
             <p:cNvPr id="5" name="Picture 4">
               <a:extLst>
                 <a:ext uri="{FF2B5EF4-FFF2-40B4-BE49-F238E27FC236}">
-                  <a16:creationId xmlns:a16="http://schemas.microsoft.com/office/drawing/2014/main" id="{4D6649D7-76B3-40F8-8777-E26C28DAB367}"/>
+                  <a16:creationId xmlns:a16="http://schemas.microsoft.com/office/drawing/2014/main" xmlns="" id="{4D6649D7-76B3-40F8-8777-E26C28DAB367}"/>
                 </a:ext>
               </a:extLst>
             </p:cNvPr>
@@ -15524,7 +15632,7 @@
             <p:cNvPr id="6" name="TextBox 5">
               <a:extLst>
                 <a:ext uri="{FF2B5EF4-FFF2-40B4-BE49-F238E27FC236}">
-                  <a16:creationId xmlns:a16="http://schemas.microsoft.com/office/drawing/2014/main" id="{5383FDA0-4160-47E2-87F0-193F075F716D}"/>
+                  <a16:creationId xmlns:a16="http://schemas.microsoft.com/office/drawing/2014/main" xmlns="" id="{5383FDA0-4160-47E2-87F0-193F075F716D}"/>
                 </a:ext>
               </a:extLst>
             </p:cNvPr>
@@ -15561,7 +15669,7 @@
           <p:cNvPr id="11" name="Group 10">
             <a:extLst>
               <a:ext uri="{FF2B5EF4-FFF2-40B4-BE49-F238E27FC236}">
-                <a16:creationId xmlns:a16="http://schemas.microsoft.com/office/drawing/2014/main" id="{91192D35-5696-4C19-BBF0-8F8464256118}"/>
+                <a16:creationId xmlns:a16="http://schemas.microsoft.com/office/drawing/2014/main" xmlns="" id="{91192D35-5696-4C19-BBF0-8F8464256118}"/>
               </a:ext>
             </a:extLst>
           </p:cNvPr>
@@ -15581,7 +15689,7 @@
             <p:cNvPr id="7" name="Picture 6">
               <a:extLst>
                 <a:ext uri="{FF2B5EF4-FFF2-40B4-BE49-F238E27FC236}">
-                  <a16:creationId xmlns:a16="http://schemas.microsoft.com/office/drawing/2014/main" id="{36C4792A-4331-4DD7-95AB-32F7CBA47C62}"/>
+                  <a16:creationId xmlns:a16="http://schemas.microsoft.com/office/drawing/2014/main" xmlns="" id="{36C4792A-4331-4DD7-95AB-32F7CBA47C62}"/>
                 </a:ext>
               </a:extLst>
             </p:cNvPr>
@@ -15611,7 +15719,7 @@
             <p:cNvPr id="8" name="TextBox 7">
               <a:extLst>
                 <a:ext uri="{FF2B5EF4-FFF2-40B4-BE49-F238E27FC236}">
-                  <a16:creationId xmlns:a16="http://schemas.microsoft.com/office/drawing/2014/main" id="{6E192C3C-4563-43C9-954A-0D6D7BE43215}"/>
+                  <a16:creationId xmlns:a16="http://schemas.microsoft.com/office/drawing/2014/main" xmlns="" id="{6E192C3C-4563-43C9-954A-0D6D7BE43215}"/>
                 </a:ext>
               </a:extLst>
             </p:cNvPr>
@@ -15647,7 +15755,7 @@
             <p:cNvPr id="9" name="Rectangle 8">
               <a:extLst>
                 <a:ext uri="{FF2B5EF4-FFF2-40B4-BE49-F238E27FC236}">
-                  <a16:creationId xmlns:a16="http://schemas.microsoft.com/office/drawing/2014/main" id="{FDE07B65-C9F8-4031-9D67-F806FF9B2634}"/>
+                  <a16:creationId xmlns:a16="http://schemas.microsoft.com/office/drawing/2014/main" xmlns="" id="{FDE07B65-C9F8-4031-9D67-F806FF9B2634}"/>
                 </a:ext>
               </a:extLst>
             </p:cNvPr>
@@ -15694,7 +15802,7 @@
           <p:cNvPr id="10" name="Title 9">
             <a:extLst>
               <a:ext uri="{FF2B5EF4-FFF2-40B4-BE49-F238E27FC236}">
-                <a16:creationId xmlns:a16="http://schemas.microsoft.com/office/drawing/2014/main" id="{B642B9E9-8BD4-4674-A331-0EDDEEA666DA}"/>
+                <a16:creationId xmlns:a16="http://schemas.microsoft.com/office/drawing/2014/main" xmlns="" id="{B642B9E9-8BD4-4674-A331-0EDDEEA666DA}"/>
               </a:ext>
             </a:extLst>
           </p:cNvPr>
@@ -15729,6 +15837,317 @@
   <p:clrMapOvr>
     <a:masterClrMapping/>
   </p:clrMapOvr>
+  <p:timing>
+    <p:tnLst>
+      <p:par>
+        <p:cTn id="1" dur="indefinite" restart="never" nodeType="tmRoot">
+          <p:childTnLst>
+            <p:seq concurrent="1" nextAc="seek">
+              <p:cTn id="2" dur="indefinite" nodeType="mainSeq">
+                <p:childTnLst>
+                  <p:par>
+                    <p:cTn id="3" fill="hold">
+                      <p:stCondLst>
+                        <p:cond delay="indefinite"/>
+                      </p:stCondLst>
+                      <p:childTnLst>
+                        <p:par>
+                          <p:cTn id="4" fill="hold">
+                            <p:stCondLst>
+                              <p:cond delay="0"/>
+                            </p:stCondLst>
+                            <p:childTnLst>
+                              <p:par>
+                                <p:cTn id="5" presetID="2" presetClass="entr" presetSubtype="4" fill="hold" nodeType="clickEffect">
+                                  <p:stCondLst>
+                                    <p:cond delay="0"/>
+                                  </p:stCondLst>
+                                  <p:childTnLst>
+                                    <p:set>
+                                      <p:cBhvr>
+                                        <p:cTn id="6" dur="1" fill="hold">
+                                          <p:stCondLst>
+                                            <p:cond delay="0"/>
+                                          </p:stCondLst>
+                                        </p:cTn>
+                                        <p:tgtEl>
+                                          <p:spTgt spid="12"/>
+                                        </p:tgtEl>
+                                        <p:attrNameLst>
+                                          <p:attrName>style.visibility</p:attrName>
+                                        </p:attrNameLst>
+                                      </p:cBhvr>
+                                      <p:to>
+                                        <p:strVal val="visible"/>
+                                      </p:to>
+                                    </p:set>
+                                    <p:anim calcmode="lin" valueType="num">
+                                      <p:cBhvr additive="base">
+                                        <p:cTn id="7" dur="500" fill="hold"/>
+                                        <p:tgtEl>
+                                          <p:spTgt spid="12"/>
+                                        </p:tgtEl>
+                                        <p:attrNameLst>
+                                          <p:attrName>ppt_x</p:attrName>
+                                        </p:attrNameLst>
+                                      </p:cBhvr>
+                                      <p:tavLst>
+                                        <p:tav tm="0">
+                                          <p:val>
+                                            <p:strVal val="#ppt_x"/>
+                                          </p:val>
+                                        </p:tav>
+                                        <p:tav tm="100000">
+                                          <p:val>
+                                            <p:strVal val="#ppt_x"/>
+                                          </p:val>
+                                        </p:tav>
+                                      </p:tavLst>
+                                    </p:anim>
+                                    <p:anim calcmode="lin" valueType="num">
+                                      <p:cBhvr additive="base">
+                                        <p:cTn id="8" dur="500" fill="hold"/>
+                                        <p:tgtEl>
+                                          <p:spTgt spid="12"/>
+                                        </p:tgtEl>
+                                        <p:attrNameLst>
+                                          <p:attrName>ppt_y</p:attrName>
+                                        </p:attrNameLst>
+                                      </p:cBhvr>
+                                      <p:tavLst>
+                                        <p:tav tm="0">
+                                          <p:val>
+                                            <p:strVal val="1+#ppt_h/2"/>
+                                          </p:val>
+                                        </p:tav>
+                                        <p:tav tm="100000">
+                                          <p:val>
+                                            <p:strVal val="#ppt_y"/>
+                                          </p:val>
+                                        </p:tav>
+                                      </p:tavLst>
+                                    </p:anim>
+                                  </p:childTnLst>
+                                </p:cTn>
+                              </p:par>
+                            </p:childTnLst>
+                          </p:cTn>
+                        </p:par>
+                      </p:childTnLst>
+                    </p:cTn>
+                  </p:par>
+                  <p:par>
+                    <p:cTn id="9" fill="hold">
+                      <p:stCondLst>
+                        <p:cond delay="indefinite"/>
+                      </p:stCondLst>
+                      <p:childTnLst>
+                        <p:par>
+                          <p:cTn id="10" fill="hold">
+                            <p:stCondLst>
+                              <p:cond delay="0"/>
+                            </p:stCondLst>
+                            <p:childTnLst>
+                              <p:par>
+                                <p:cTn id="11" presetID="2" presetClass="entr" presetSubtype="8" fill="hold" nodeType="clickEffect">
+                                  <p:stCondLst>
+                                    <p:cond delay="0"/>
+                                  </p:stCondLst>
+                                  <p:childTnLst>
+                                    <p:set>
+                                      <p:cBhvr>
+                                        <p:cTn id="12" dur="1" fill="hold">
+                                          <p:stCondLst>
+                                            <p:cond delay="0"/>
+                                          </p:stCondLst>
+                                        </p:cTn>
+                                        <p:tgtEl>
+                                          <p:spTgt spid="13"/>
+                                        </p:tgtEl>
+                                        <p:attrNameLst>
+                                          <p:attrName>style.visibility</p:attrName>
+                                        </p:attrNameLst>
+                                      </p:cBhvr>
+                                      <p:to>
+                                        <p:strVal val="visible"/>
+                                      </p:to>
+                                    </p:set>
+                                    <p:anim calcmode="lin" valueType="num">
+                                      <p:cBhvr additive="base">
+                                        <p:cTn id="13" dur="500" fill="hold"/>
+                                        <p:tgtEl>
+                                          <p:spTgt spid="13"/>
+                                        </p:tgtEl>
+                                        <p:attrNameLst>
+                                          <p:attrName>ppt_x</p:attrName>
+                                        </p:attrNameLst>
+                                      </p:cBhvr>
+                                      <p:tavLst>
+                                        <p:tav tm="0">
+                                          <p:val>
+                                            <p:strVal val="0-#ppt_w/2"/>
+                                          </p:val>
+                                        </p:tav>
+                                        <p:tav tm="100000">
+                                          <p:val>
+                                            <p:strVal val="#ppt_x"/>
+                                          </p:val>
+                                        </p:tav>
+                                      </p:tavLst>
+                                    </p:anim>
+                                    <p:anim calcmode="lin" valueType="num">
+                                      <p:cBhvr additive="base">
+                                        <p:cTn id="14" dur="500" fill="hold"/>
+                                        <p:tgtEl>
+                                          <p:spTgt spid="13"/>
+                                        </p:tgtEl>
+                                        <p:attrNameLst>
+                                          <p:attrName>ppt_y</p:attrName>
+                                        </p:attrNameLst>
+                                      </p:cBhvr>
+                                      <p:tavLst>
+                                        <p:tav tm="0">
+                                          <p:val>
+                                            <p:strVal val="#ppt_y"/>
+                                          </p:val>
+                                        </p:tav>
+                                        <p:tav tm="100000">
+                                          <p:val>
+                                            <p:strVal val="#ppt_y"/>
+                                          </p:val>
+                                        </p:tav>
+                                      </p:tavLst>
+                                    </p:anim>
+                                  </p:childTnLst>
+                                </p:cTn>
+                              </p:par>
+                            </p:childTnLst>
+                          </p:cTn>
+                        </p:par>
+                      </p:childTnLst>
+                    </p:cTn>
+                  </p:par>
+                  <p:par>
+                    <p:cTn id="15" fill="hold">
+                      <p:stCondLst>
+                        <p:cond delay="indefinite"/>
+                      </p:stCondLst>
+                      <p:childTnLst>
+                        <p:par>
+                          <p:cTn id="16" fill="hold">
+                            <p:stCondLst>
+                              <p:cond delay="0"/>
+                            </p:stCondLst>
+                            <p:childTnLst>
+                              <p:par>
+                                <p:cTn id="17" presetID="47" presetClass="entr" presetSubtype="0" fill="hold" nodeType="clickEffect">
+                                  <p:stCondLst>
+                                    <p:cond delay="0"/>
+                                  </p:stCondLst>
+                                  <p:childTnLst>
+                                    <p:set>
+                                      <p:cBhvr>
+                                        <p:cTn id="18" dur="1" fill="hold">
+                                          <p:stCondLst>
+                                            <p:cond delay="0"/>
+                                          </p:stCondLst>
+                                        </p:cTn>
+                                        <p:tgtEl>
+                                          <p:spTgt spid="11"/>
+                                        </p:tgtEl>
+                                        <p:attrNameLst>
+                                          <p:attrName>style.visibility</p:attrName>
+                                        </p:attrNameLst>
+                                      </p:cBhvr>
+                                      <p:to>
+                                        <p:strVal val="visible"/>
+                                      </p:to>
+                                    </p:set>
+                                    <p:animEffect transition="in" filter="fade">
+                                      <p:cBhvr>
+                                        <p:cTn id="19" dur="1000"/>
+                                        <p:tgtEl>
+                                          <p:spTgt spid="11"/>
+                                        </p:tgtEl>
+                                      </p:cBhvr>
+                                    </p:animEffect>
+                                    <p:anim calcmode="lin" valueType="num">
+                                      <p:cBhvr>
+                                        <p:cTn id="20" dur="1000" fill="hold"/>
+                                        <p:tgtEl>
+                                          <p:spTgt spid="11"/>
+                                        </p:tgtEl>
+                                        <p:attrNameLst>
+                                          <p:attrName>ppt_x</p:attrName>
+                                        </p:attrNameLst>
+                                      </p:cBhvr>
+                                      <p:tavLst>
+                                        <p:tav tm="0">
+                                          <p:val>
+                                            <p:strVal val="#ppt_x"/>
+                                          </p:val>
+                                        </p:tav>
+                                        <p:tav tm="100000">
+                                          <p:val>
+                                            <p:strVal val="#ppt_x"/>
+                                          </p:val>
+                                        </p:tav>
+                                      </p:tavLst>
+                                    </p:anim>
+                                    <p:anim calcmode="lin" valueType="num">
+                                      <p:cBhvr>
+                                        <p:cTn id="21" dur="1000" fill="hold"/>
+                                        <p:tgtEl>
+                                          <p:spTgt spid="11"/>
+                                        </p:tgtEl>
+                                        <p:attrNameLst>
+                                          <p:attrName>ppt_y</p:attrName>
+                                        </p:attrNameLst>
+                                      </p:cBhvr>
+                                      <p:tavLst>
+                                        <p:tav tm="0">
+                                          <p:val>
+                                            <p:strVal val="#ppt_y-.1"/>
+                                          </p:val>
+                                        </p:tav>
+                                        <p:tav tm="100000">
+                                          <p:val>
+                                            <p:strVal val="#ppt_y"/>
+                                          </p:val>
+                                        </p:tav>
+                                      </p:tavLst>
+                                    </p:anim>
+                                  </p:childTnLst>
+                                </p:cTn>
+                              </p:par>
+                            </p:childTnLst>
+                          </p:cTn>
+                        </p:par>
+                      </p:childTnLst>
+                    </p:cTn>
+                  </p:par>
+                </p:childTnLst>
+              </p:cTn>
+              <p:prevCondLst>
+                <p:cond evt="onPrev" delay="0">
+                  <p:tgtEl>
+                    <p:sldTgt/>
+                  </p:tgtEl>
+                </p:cond>
+              </p:prevCondLst>
+              <p:nextCondLst>
+                <p:cond evt="onNext" delay="0">
+                  <p:tgtEl>
+                    <p:sldTgt/>
+                  </p:tgtEl>
+                </p:cond>
+              </p:nextCondLst>
+            </p:seq>
+          </p:childTnLst>
+        </p:cTn>
+      </p:par>
+    </p:tnLst>
+  </p:timing>
 </p:sld>
 </file>
 
@@ -15754,7 +16173,7 @@
           <p:cNvPr id="2" name="Picture 1">
             <a:extLst>
               <a:ext uri="{FF2B5EF4-FFF2-40B4-BE49-F238E27FC236}">
-                <a16:creationId xmlns:a16="http://schemas.microsoft.com/office/drawing/2014/main" id="{2DC3C259-AE11-4A88-B5E5-2E249010F78C}"/>
+                <a16:creationId xmlns:a16="http://schemas.microsoft.com/office/drawing/2014/main" xmlns="" id="{2DC3C259-AE11-4A88-B5E5-2E249010F78C}"/>
               </a:ext>
             </a:extLst>
           </p:cNvPr>
@@ -15784,7 +16203,7 @@
           <p:cNvPr id="3" name="Picture 2">
             <a:extLst>
               <a:ext uri="{FF2B5EF4-FFF2-40B4-BE49-F238E27FC236}">
-                <a16:creationId xmlns:a16="http://schemas.microsoft.com/office/drawing/2014/main" id="{E832C9CD-FC66-4239-B59C-075CE59DCE3E}"/>
+                <a16:creationId xmlns:a16="http://schemas.microsoft.com/office/drawing/2014/main" xmlns="" id="{E832C9CD-FC66-4239-B59C-075CE59DCE3E}"/>
               </a:ext>
             </a:extLst>
           </p:cNvPr>
@@ -15927,7 +16346,7 @@
           <p:cNvPr id="2" name="Picture 1">
             <a:extLst>
               <a:ext uri="{FF2B5EF4-FFF2-40B4-BE49-F238E27FC236}">
-                <a16:creationId xmlns:a16="http://schemas.microsoft.com/office/drawing/2014/main" id="{D648621B-C8DA-4B7E-83F0-8F005177587F}"/>
+                <a16:creationId xmlns:a16="http://schemas.microsoft.com/office/drawing/2014/main" xmlns="" id="{D648621B-C8DA-4B7E-83F0-8F005177587F}"/>
               </a:ext>
             </a:extLst>
           </p:cNvPr>
@@ -15957,7 +16376,7 @@
           <p:cNvPr id="3" name="Title 2">
             <a:extLst>
               <a:ext uri="{FF2B5EF4-FFF2-40B4-BE49-F238E27FC236}">
-                <a16:creationId xmlns:a16="http://schemas.microsoft.com/office/drawing/2014/main" id="{779B900B-86EC-4929-9B1D-6D36F77F7B51}"/>
+                <a16:creationId xmlns:a16="http://schemas.microsoft.com/office/drawing/2014/main" xmlns="" id="{779B900B-86EC-4929-9B1D-6D36F77F7B51}"/>
               </a:ext>
             </a:extLst>
           </p:cNvPr>
@@ -15992,6 +16411,13 @@
   <p:clrMapOvr>
     <a:masterClrMapping/>
   </p:clrMapOvr>
+  <p:timing>
+    <p:tnLst>
+      <p:par>
+        <p:cTn id="1" dur="indefinite" restart="never" nodeType="tmRoot"/>
+      </p:par>
+    </p:tnLst>
+  </p:timing>
 </p:sld>
 </file>
 
@@ -16017,7 +16443,7 @@
           <p:cNvPr id="2" name="Title 1">
             <a:extLst>
               <a:ext uri="{FF2B5EF4-FFF2-40B4-BE49-F238E27FC236}">
-                <a16:creationId xmlns:a16="http://schemas.microsoft.com/office/drawing/2014/main" id="{8111F0B3-66D6-43F7-ACBD-A1320C655EE6}"/>
+                <a16:creationId xmlns:a16="http://schemas.microsoft.com/office/drawing/2014/main" xmlns="" id="{8111F0B3-66D6-43F7-ACBD-A1320C655EE6}"/>
               </a:ext>
             </a:extLst>
           </p:cNvPr>
@@ -16057,7 +16483,7 @@
           <p:cNvPr id="3" name="Content Placeholder 2">
             <a:extLst>
               <a:ext uri="{FF2B5EF4-FFF2-40B4-BE49-F238E27FC236}">
-                <a16:creationId xmlns:a16="http://schemas.microsoft.com/office/drawing/2014/main" id="{41D11086-9659-498F-9582-2BAE6C3D5582}"/>
+                <a16:creationId xmlns:a16="http://schemas.microsoft.com/office/drawing/2014/main" xmlns="" id="{41D11086-9659-498F-9582-2BAE6C3D5582}"/>
               </a:ext>
             </a:extLst>
           </p:cNvPr>
@@ -16075,48 +16501,50 @@
           </a:xfrm>
         </p:spPr>
         <p:txBody>
-          <a:bodyPr/>
+          <a:bodyPr>
+            <a:normAutofit/>
+          </a:bodyPr>
           <a:lstStyle/>
           <a:p>
             <a:r>
-              <a:rPr lang="en-GB" dirty="0"/>
+              <a:rPr lang="en-GB" sz="2800" dirty="0"/>
               <a:t>Kafka has default max message size of 1MB – can be configured</a:t>
             </a:r>
           </a:p>
           <a:p>
             <a:pPr lvl="1"/>
             <a:r>
-              <a:rPr lang="en-US" dirty="0"/>
+              <a:rPr lang="en-US" sz="2400" dirty="0"/>
               <a:t>Kafka configuration + config when creating the producer</a:t>
             </a:r>
           </a:p>
           <a:p>
             <a:pPr lvl="1"/>
-            <a:endParaRPr lang="en-US" dirty="0"/>
+            <a:endParaRPr lang="en-US" sz="2400" dirty="0"/>
           </a:p>
           <a:p>
             <a:pPr lvl="1"/>
-            <a:endParaRPr lang="en-US" dirty="0"/>
+            <a:endParaRPr lang="en-US" sz="2400" dirty="0"/>
           </a:p>
           <a:p>
             <a:pPr lvl="1"/>
-            <a:endParaRPr lang="en-US" dirty="0"/>
+            <a:endParaRPr lang="en-US" sz="2400" dirty="0"/>
           </a:p>
           <a:p>
             <a:pPr lvl="1"/>
-            <a:endParaRPr lang="en-US" dirty="0"/>
+            <a:endParaRPr lang="en-US" sz="2400" dirty="0"/>
           </a:p>
           <a:p>
             <a:pPr lvl="1"/>
-            <a:endParaRPr lang="en-US" dirty="0"/>
+            <a:endParaRPr lang="en-US" sz="2400" dirty="0"/>
           </a:p>
           <a:p>
             <a:pPr lvl="1"/>
-            <a:endParaRPr lang="en-US" dirty="0"/>
+            <a:endParaRPr lang="en-US" sz="2400" dirty="0"/>
           </a:p>
           <a:p>
             <a:pPr lvl="1"/>
-            <a:endParaRPr lang="en-US" dirty="0"/>
+            <a:endParaRPr lang="en-US" sz="2400" dirty="0"/>
           </a:p>
         </p:txBody>
       </p:sp>
@@ -16125,7 +16553,7 @@
           <p:cNvPr id="4" name="Picture 3">
             <a:extLst>
               <a:ext uri="{FF2B5EF4-FFF2-40B4-BE49-F238E27FC236}">
-                <a16:creationId xmlns:a16="http://schemas.microsoft.com/office/drawing/2014/main" id="{4867BE5E-8E36-4C5C-AA58-D2EE57F681A9}"/>
+                <a16:creationId xmlns:a16="http://schemas.microsoft.com/office/drawing/2014/main" xmlns="" id="{4867BE5E-8E36-4C5C-AA58-D2EE57F681A9}"/>
               </a:ext>
             </a:extLst>
           </p:cNvPr>
@@ -16155,7 +16583,7 @@
           <p:cNvPr id="6" name="Picture 5">
             <a:extLst>
               <a:ext uri="{FF2B5EF4-FFF2-40B4-BE49-F238E27FC236}">
-                <a16:creationId xmlns:a16="http://schemas.microsoft.com/office/drawing/2014/main" id="{6921D0D2-1210-496B-998F-148B2E016E9E}"/>
+                <a16:creationId xmlns:a16="http://schemas.microsoft.com/office/drawing/2014/main" xmlns="" id="{6921D0D2-1210-496B-998F-148B2E016E9E}"/>
               </a:ext>
             </a:extLst>
           </p:cNvPr>
@@ -16618,7 +17046,7 @@
           <p:cNvPr id="2" name="Title 1">
             <a:extLst>
               <a:ext uri="{FF2B5EF4-FFF2-40B4-BE49-F238E27FC236}">
-                <a16:creationId xmlns:a16="http://schemas.microsoft.com/office/drawing/2014/main" id="{8111F0B3-66D6-43F7-ACBD-A1320C655EE6}"/>
+                <a16:creationId xmlns:a16="http://schemas.microsoft.com/office/drawing/2014/main" xmlns="" id="{8111F0B3-66D6-43F7-ACBD-A1320C655EE6}"/>
               </a:ext>
             </a:extLst>
           </p:cNvPr>
@@ -16658,7 +17086,7 @@
           <p:cNvPr id="3" name="Content Placeholder 2">
             <a:extLst>
               <a:ext uri="{FF2B5EF4-FFF2-40B4-BE49-F238E27FC236}">
-                <a16:creationId xmlns:a16="http://schemas.microsoft.com/office/drawing/2014/main" id="{41D11086-9659-498F-9582-2BAE6C3D5582}"/>
+                <a16:creationId xmlns:a16="http://schemas.microsoft.com/office/drawing/2014/main" xmlns="" id="{41D11086-9659-498F-9582-2BAE6C3D5582}"/>
               </a:ext>
             </a:extLst>
           </p:cNvPr>
@@ -16676,44 +17104,46 @@
           </a:xfrm>
         </p:spPr>
         <p:txBody>
-          <a:bodyPr/>
+          <a:bodyPr>
+            <a:normAutofit/>
+          </a:bodyPr>
           <a:lstStyle/>
           <a:p>
             <a:r>
-              <a:rPr lang="en-US" dirty="0"/>
+              <a:rPr lang="en-US" sz="2800" dirty="0"/>
               <a:t>Saving raw JSON in </a:t>
             </a:r>
             <a:r>
-              <a:rPr lang="en-US" dirty="0" err="1"/>
+              <a:rPr lang="en-US" sz="2800" dirty="0" err="1"/>
               <a:t>hdfs</a:t>
             </a:r>
             <a:r>
-              <a:rPr lang="en-US" dirty="0"/>
+              <a:rPr lang="en-US" sz="2800" dirty="0"/>
               <a:t> vs parquet </a:t>
             </a:r>
             <a:r>
-              <a:rPr lang="en-US" dirty="0" err="1"/>
+              <a:rPr lang="en-US" sz="2800" dirty="0" err="1"/>
               <a:t>fromat</a:t>
             </a:r>
-            <a:endParaRPr lang="en-US" dirty="0"/>
-          </a:p>
-          <a:p>
-            <a:endParaRPr lang="en-US" dirty="0"/>
-          </a:p>
-          <a:p>
-            <a:endParaRPr lang="en-US" dirty="0"/>
-          </a:p>
-          <a:p>
-            <a:endParaRPr lang="en-US" dirty="0"/>
-          </a:p>
-          <a:p>
-            <a:r>
-              <a:rPr lang="en-US" dirty="0"/>
+            <a:endParaRPr lang="en-US" sz="2800" dirty="0"/>
+          </a:p>
+          <a:p>
+            <a:endParaRPr lang="en-US" sz="2800" dirty="0"/>
+          </a:p>
+          <a:p>
+            <a:endParaRPr lang="en-US" sz="2800" dirty="0"/>
+          </a:p>
+          <a:p>
+            <a:endParaRPr lang="en-US" sz="2800" dirty="0"/>
+          </a:p>
+          <a:p>
+            <a:r>
+              <a:rPr lang="en-US" sz="2800" dirty="0"/>
               <a:t>Spark Structured Streaming and Bool values</a:t>
             </a:r>
           </a:p>
           <a:p>
-            <a:endParaRPr lang="en-US" dirty="0"/>
+            <a:endParaRPr lang="en-US" sz="2800" dirty="0"/>
           </a:p>
         </p:txBody>
       </p:sp>
@@ -16722,7 +17152,7 @@
           <p:cNvPr id="5" name="Picture 4">
             <a:extLst>
               <a:ext uri="{FF2B5EF4-FFF2-40B4-BE49-F238E27FC236}">
-                <a16:creationId xmlns:a16="http://schemas.microsoft.com/office/drawing/2014/main" id="{AE327305-F33D-4E96-A49B-AEF606B917F7}"/>
+                <a16:creationId xmlns:a16="http://schemas.microsoft.com/office/drawing/2014/main" xmlns="" id="{AE327305-F33D-4E96-A49B-AEF606B917F7}"/>
               </a:ext>
             </a:extLst>
           </p:cNvPr>
@@ -16739,7 +17169,7 @@
         </p:blipFill>
         <p:spPr>
           <a:xfrm>
-            <a:off x="3464752" y="2672184"/>
+            <a:off x="3464752" y="2429591"/>
             <a:ext cx="8255463" cy="961357"/>
           </a:xfrm>
           <a:prstGeom prst="rect">
@@ -16752,7 +17182,7 @@
           <p:cNvPr id="6" name="Rectangle 5">
             <a:extLst>
               <a:ext uri="{FF2B5EF4-FFF2-40B4-BE49-F238E27FC236}">
-                <a16:creationId xmlns:a16="http://schemas.microsoft.com/office/drawing/2014/main" id="{9EEDD3A9-B284-44FF-8745-896BE4AEDF05}"/>
+                <a16:creationId xmlns:a16="http://schemas.microsoft.com/office/drawing/2014/main" xmlns="" id="{9EEDD3A9-B284-44FF-8745-896BE4AEDF05}"/>
               </a:ext>
             </a:extLst>
           </p:cNvPr>
@@ -16761,7 +17191,7 @@
         </p:nvSpPr>
         <p:spPr>
           <a:xfrm>
-            <a:off x="3464752" y="2875552"/>
+            <a:off x="3464752" y="2632959"/>
             <a:ext cx="4933290" cy="276727"/>
           </a:xfrm>
           <a:prstGeom prst="rect">
@@ -16798,7 +17228,7 @@
           <p:cNvPr id="7" name="TextBox 6">
             <a:extLst>
               <a:ext uri="{FF2B5EF4-FFF2-40B4-BE49-F238E27FC236}">
-                <a16:creationId xmlns:a16="http://schemas.microsoft.com/office/drawing/2014/main" id="{7EDFE0B1-A35B-4B4C-BEAC-5273679ED4DE}"/>
+                <a16:creationId xmlns:a16="http://schemas.microsoft.com/office/drawing/2014/main" xmlns="" id="{7EDFE0B1-A35B-4B4C-BEAC-5273679ED4DE}"/>
               </a:ext>
             </a:extLst>
           </p:cNvPr>
@@ -16847,7 +17277,7 @@
           <p:cNvPr id="9" name="Straight Arrow Connector 8">
             <a:extLst>
               <a:ext uri="{FF2B5EF4-FFF2-40B4-BE49-F238E27FC236}">
-                <a16:creationId xmlns:a16="http://schemas.microsoft.com/office/drawing/2014/main" id="{2C0E3215-D259-4DA4-A796-7E800D62B85E}"/>
+                <a16:creationId xmlns:a16="http://schemas.microsoft.com/office/drawing/2014/main" xmlns="" id="{2C0E3215-D259-4DA4-A796-7E800D62B85E}"/>
               </a:ext>
             </a:extLst>
           </p:cNvPr>
@@ -16861,7 +17291,7 @@
         <p:spPr>
           <a:xfrm>
             <a:off x="2307715" y="1768146"/>
-            <a:ext cx="1157037" cy="1245770"/>
+            <a:ext cx="1157037" cy="1003177"/>
           </a:xfrm>
           <a:prstGeom prst="straightConnector1">
             <a:avLst/>
@@ -16890,7 +17320,7 @@
           <p:cNvPr id="13" name="Rectangle 12">
             <a:extLst>
               <a:ext uri="{FF2B5EF4-FFF2-40B4-BE49-F238E27FC236}">
-                <a16:creationId xmlns:a16="http://schemas.microsoft.com/office/drawing/2014/main" id="{570461C2-8867-4C83-B70A-79A19C7B791A}"/>
+                <a16:creationId xmlns:a16="http://schemas.microsoft.com/office/drawing/2014/main" xmlns="" id="{570461C2-8867-4C83-B70A-79A19C7B791A}"/>
               </a:ext>
             </a:extLst>
           </p:cNvPr>
@@ -16899,7 +17329,7 @@
         </p:nvSpPr>
         <p:spPr>
           <a:xfrm>
-            <a:off x="3436678" y="3355647"/>
+            <a:off x="3436678" y="3113054"/>
             <a:ext cx="5871208" cy="257046"/>
           </a:xfrm>
           <a:prstGeom prst="rect">
@@ -16940,7 +17370,7 @@
           <p:cNvPr id="16" name="Picture 15">
             <a:extLst>
               <a:ext uri="{FF2B5EF4-FFF2-40B4-BE49-F238E27FC236}">
-                <a16:creationId xmlns:a16="http://schemas.microsoft.com/office/drawing/2014/main" id="{E8183956-4E03-4B5F-9D1A-6D6ECD78B9DC}"/>
+                <a16:creationId xmlns:a16="http://schemas.microsoft.com/office/drawing/2014/main" xmlns="" id="{E8183956-4E03-4B5F-9D1A-6D6ECD78B9DC}"/>
               </a:ext>
             </a:extLst>
           </p:cNvPr>
@@ -16957,7 +17387,7 @@
         </p:blipFill>
         <p:spPr>
           <a:xfrm>
-            <a:off x="3786710" y="4336509"/>
+            <a:off x="3786710" y="4541780"/>
             <a:ext cx="7528990" cy="945270"/>
           </a:xfrm>
           <a:prstGeom prst="rect">
@@ -17765,7 +18195,7 @@
   <a:extraClrSchemeLst/>
   <a:extLst>
     <a:ext uri="{05A4C25C-085E-4340-85A3-A5531E510DB2}">
-      <thm15:themeFamily xmlns:thm15="http://schemas.microsoft.com/office/thememl/2012/main" name="Frame" id="{F226E7A2-7162-461C-9490-D27D9DC04E43}" vid="{629A0216-3BBD-45C0-B63F-2683BEA18F60}"/>
+      <thm15:themeFamily xmlns:thm15="http://schemas.microsoft.com/office/thememl/2012/main" xmlns="" name="Frame" id="{F226E7A2-7162-461C-9490-D27D9DC04E43}" vid="{629A0216-3BBD-45C0-B63F-2683BEA18F60}"/>
     </a:ext>
   </a:extLst>
 </a:theme>
@@ -18060,7 +18490,7 @@
   <a:extraClrSchemeLst/>
   <a:extLst>
     <a:ext uri="{05A4C25C-085E-4340-85A3-A5531E510DB2}">
-      <thm15:themeFamily xmlns:thm15="http://schemas.microsoft.com/office/thememl/2012/main" name="Office Theme" id="{62F939B6-93AF-4DB8-9C6B-D6C7DFDC589F}" vid="{4A3C46E8-61CC-4603-A589-7422A47A8E4A}"/>
+      <thm15:themeFamily xmlns:thm15="http://schemas.microsoft.com/office/thememl/2012/main" xmlns="" name="Office Theme" id="{62F939B6-93AF-4DB8-9C6B-D6C7DFDC589F}" vid="{4A3C46E8-61CC-4603-A589-7422A47A8E4A}"/>
     </a:ext>
   </a:extLst>
 </a:theme>

</xml_diff>

<commit_message>
PPTX after presentation in class 2020-01-16 20:07:00
</commit_message>
<xml_diff>
--- a/FinalProjectDesign.pptx
+++ b/FinalProjectDesign.pptx
@@ -9136,6 +9136,32 @@
           <a:p>
             <a:endParaRPr lang="en-US" sz="2800" dirty="0"/>
           </a:p>
+          <a:p>
+            <a:r>
+              <a:rPr lang="en-US" sz="2800" dirty="0" smtClean="0"/>
+              <a:t>Append data directly into </a:t>
+            </a:r>
+            <a:r>
+              <a:rPr lang="en-US" sz="2800" dirty="0" err="1" smtClean="0"/>
+              <a:t>hdfs</a:t>
+            </a:r>
+            <a:r>
+              <a:rPr lang="en-US" sz="2800" dirty="0" smtClean="0"/>
+              <a:t> as parquet -&gt; then update Impala tables</a:t>
+            </a:r>
+          </a:p>
+          <a:p>
+            <a:endParaRPr lang="en-US" sz="2800" dirty="0" smtClean="0"/>
+          </a:p>
+          <a:p>
+            <a:endParaRPr lang="en-US" sz="2800" dirty="0"/>
+          </a:p>
+          <a:p>
+            <a:endParaRPr lang="en-US" sz="2800" dirty="0" smtClean="0"/>
+          </a:p>
+          <a:p>
+            <a:endParaRPr lang="en-US" sz="2800" dirty="0"/>
+          </a:p>
         </p:txBody>
       </p:sp>
       <p:pic>
@@ -9160,12 +9186,66 @@
         </p:blipFill>
         <p:spPr>
           <a:xfrm>
-            <a:off x="3933523" y="3112912"/>
+            <a:off x="3846033" y="1489386"/>
             <a:ext cx="7528990" cy="945270"/>
           </a:xfrm>
           <a:prstGeom prst="rect">
             <a:avLst/>
           </a:prstGeom>
+        </p:spPr>
+      </p:pic>
+      <p:pic>
+        <p:nvPicPr>
+          <p:cNvPr id="1026" name="Picture 2"/>
+          <p:cNvPicPr>
+            <a:picLocks noChangeAspect="1" noChangeArrowheads="1"/>
+          </p:cNvPicPr>
+          <p:nvPr/>
+        </p:nvPicPr>
+        <p:blipFill>
+          <a:blip r:embed="rId4">
+            <a:extLst>
+              <a:ext uri="{28A0092B-C50C-407E-A947-70E740481C1C}">
+                <a14:useLocalDpi xmlns:a14="http://schemas.microsoft.com/office/drawing/2010/main" val="0"/>
+              </a:ext>
+            </a:extLst>
+          </a:blip>
+          <a:srcRect/>
+          <a:stretch>
+            <a:fillRect/>
+          </a:stretch>
+        </p:blipFill>
+        <p:spPr bwMode="auto">
+          <a:xfrm>
+            <a:off x="3648836" y="3835951"/>
+            <a:ext cx="7923383" cy="2042924"/>
+          </a:xfrm>
+          <a:prstGeom prst="rect">
+            <a:avLst/>
+          </a:prstGeom>
+          <a:noFill/>
+          <a:ln>
+            <a:noFill/>
+          </a:ln>
+          <a:extLst>
+            <a:ext uri="{909E8E84-426E-40DD-AFC4-6F175D3DCCD1}">
+              <a14:hiddenFill xmlns:a14="http://schemas.microsoft.com/office/drawing/2010/main">
+                <a:solidFill>
+                  <a:schemeClr val="accent1"/>
+                </a:solidFill>
+              </a14:hiddenFill>
+            </a:ext>
+            <a:ext uri="{91240B29-F687-4F45-9708-019B960494DF}">
+              <a14:hiddenLine xmlns:a14="http://schemas.microsoft.com/office/drawing/2010/main" w="9525">
+                <a:solidFill>
+                  <a:schemeClr val="tx1"/>
+                </a:solidFill>
+                <a:miter lim="800000"/>
+                <a:headEnd/>
+                <a:tailEnd/>
+              </a14:hiddenLine>
+            </a:ext>
+          </a:extLst>
         </p:spPr>
       </p:pic>
     </p:spTree>
@@ -9353,6 +9433,200 @@
                                         <p:cTn id="14" dur="500" fill="hold"/>
                                         <p:tgtEl>
                                           <p:spTgt spid="4"/>
+                                        </p:tgtEl>
+                                        <p:attrNameLst>
+                                          <p:attrName>ppt_y</p:attrName>
+                                        </p:attrNameLst>
+                                      </p:cBhvr>
+                                      <p:tavLst>
+                                        <p:tav tm="0">
+                                          <p:val>
+                                            <p:strVal val="#ppt_y"/>
+                                          </p:val>
+                                        </p:tav>
+                                        <p:tav tm="100000">
+                                          <p:val>
+                                            <p:strVal val="#ppt_y"/>
+                                          </p:val>
+                                        </p:tav>
+                                      </p:tavLst>
+                                    </p:anim>
+                                  </p:childTnLst>
+                                </p:cTn>
+                              </p:par>
+                            </p:childTnLst>
+                          </p:cTn>
+                        </p:par>
+                      </p:childTnLst>
+                    </p:cTn>
+                  </p:par>
+                  <p:par>
+                    <p:cTn id="15" fill="hold">
+                      <p:stCondLst>
+                        <p:cond delay="indefinite"/>
+                      </p:stCondLst>
+                      <p:childTnLst>
+                        <p:par>
+                          <p:cTn id="16" fill="hold">
+                            <p:stCondLst>
+                              <p:cond delay="0"/>
+                            </p:stCondLst>
+                            <p:childTnLst>
+                              <p:par>
+                                <p:cTn id="17" presetID="2" presetClass="entr" presetSubtype="4" fill="hold" grpId="0" nodeType="clickEffect">
+                                  <p:stCondLst>
+                                    <p:cond delay="0"/>
+                                  </p:stCondLst>
+                                  <p:childTnLst>
+                                    <p:set>
+                                      <p:cBhvr>
+                                        <p:cTn id="18" dur="1" fill="hold">
+                                          <p:stCondLst>
+                                            <p:cond delay="0"/>
+                                          </p:stCondLst>
+                                        </p:cTn>
+                                        <p:tgtEl>
+                                          <p:spTgt spid="3">
+                                            <p:txEl>
+                                              <p:pRg st="4" end="4"/>
+                                            </p:txEl>
+                                          </p:spTgt>
+                                        </p:tgtEl>
+                                        <p:attrNameLst>
+                                          <p:attrName>style.visibility</p:attrName>
+                                        </p:attrNameLst>
+                                      </p:cBhvr>
+                                      <p:to>
+                                        <p:strVal val="visible"/>
+                                      </p:to>
+                                    </p:set>
+                                    <p:anim calcmode="lin" valueType="num">
+                                      <p:cBhvr additive="base">
+                                        <p:cTn id="19" dur="500" fill="hold"/>
+                                        <p:tgtEl>
+                                          <p:spTgt spid="3">
+                                            <p:txEl>
+                                              <p:pRg st="4" end="4"/>
+                                            </p:txEl>
+                                          </p:spTgt>
+                                        </p:tgtEl>
+                                        <p:attrNameLst>
+                                          <p:attrName>ppt_x</p:attrName>
+                                        </p:attrNameLst>
+                                      </p:cBhvr>
+                                      <p:tavLst>
+                                        <p:tav tm="0">
+                                          <p:val>
+                                            <p:strVal val="#ppt_x"/>
+                                          </p:val>
+                                        </p:tav>
+                                        <p:tav tm="100000">
+                                          <p:val>
+                                            <p:strVal val="#ppt_x"/>
+                                          </p:val>
+                                        </p:tav>
+                                      </p:tavLst>
+                                    </p:anim>
+                                    <p:anim calcmode="lin" valueType="num">
+                                      <p:cBhvr additive="base">
+                                        <p:cTn id="20" dur="500" fill="hold"/>
+                                        <p:tgtEl>
+                                          <p:spTgt spid="3">
+                                            <p:txEl>
+                                              <p:pRg st="4" end="4"/>
+                                            </p:txEl>
+                                          </p:spTgt>
+                                        </p:tgtEl>
+                                        <p:attrNameLst>
+                                          <p:attrName>ppt_y</p:attrName>
+                                        </p:attrNameLst>
+                                      </p:cBhvr>
+                                      <p:tavLst>
+                                        <p:tav tm="0">
+                                          <p:val>
+                                            <p:strVal val="1+#ppt_h/2"/>
+                                          </p:val>
+                                        </p:tav>
+                                        <p:tav tm="100000">
+                                          <p:val>
+                                            <p:strVal val="#ppt_y"/>
+                                          </p:val>
+                                        </p:tav>
+                                      </p:tavLst>
+                                    </p:anim>
+                                  </p:childTnLst>
+                                </p:cTn>
+                              </p:par>
+                            </p:childTnLst>
+                          </p:cTn>
+                        </p:par>
+                      </p:childTnLst>
+                    </p:cTn>
+                  </p:par>
+                  <p:par>
+                    <p:cTn id="21" fill="hold">
+                      <p:stCondLst>
+                        <p:cond delay="indefinite"/>
+                      </p:stCondLst>
+                      <p:childTnLst>
+                        <p:par>
+                          <p:cTn id="22" fill="hold">
+                            <p:stCondLst>
+                              <p:cond delay="0"/>
+                            </p:stCondLst>
+                            <p:childTnLst>
+                              <p:par>
+                                <p:cTn id="23" presetID="2" presetClass="entr" presetSubtype="8" fill="hold" nodeType="clickEffect">
+                                  <p:stCondLst>
+                                    <p:cond delay="0"/>
+                                  </p:stCondLst>
+                                  <p:childTnLst>
+                                    <p:set>
+                                      <p:cBhvr>
+                                        <p:cTn id="24" dur="1" fill="hold">
+                                          <p:stCondLst>
+                                            <p:cond delay="0"/>
+                                          </p:stCondLst>
+                                        </p:cTn>
+                                        <p:tgtEl>
+                                          <p:spTgt spid="1026"/>
+                                        </p:tgtEl>
+                                        <p:attrNameLst>
+                                          <p:attrName>style.visibility</p:attrName>
+                                        </p:attrNameLst>
+                                      </p:cBhvr>
+                                      <p:to>
+                                        <p:strVal val="visible"/>
+                                      </p:to>
+                                    </p:set>
+                                    <p:anim calcmode="lin" valueType="num">
+                                      <p:cBhvr additive="base">
+                                        <p:cTn id="25" dur="500" fill="hold"/>
+                                        <p:tgtEl>
+                                          <p:spTgt spid="1026"/>
+                                        </p:tgtEl>
+                                        <p:attrNameLst>
+                                          <p:attrName>ppt_x</p:attrName>
+                                        </p:attrNameLst>
+                                      </p:cBhvr>
+                                      <p:tavLst>
+                                        <p:tav tm="0">
+                                          <p:val>
+                                            <p:strVal val="0-#ppt_w/2"/>
+                                          </p:val>
+                                        </p:tav>
+                                        <p:tav tm="100000">
+                                          <p:val>
+                                            <p:strVal val="#ppt_x"/>
+                                          </p:val>
+                                        </p:tav>
+                                      </p:tavLst>
+                                    </p:anim>
+                                    <p:anim calcmode="lin" valueType="num">
+                                      <p:cBhvr additive="base">
+                                        <p:cTn id="26" dur="500" fill="hold"/>
+                                        <p:tgtEl>
+                                          <p:spTgt spid="1026"/>
                                         </p:tgtEl>
                                         <p:attrNameLst>
                                           <p:attrName>ppt_y</p:attrName>
@@ -12165,7 +12439,7 @@
           <a:prstGeom prst="straightConnector1">
             <a:avLst/>
           </a:prstGeom>
-          <a:ln>
+          <a:ln w="19050">
             <a:prstDash val="dash"/>
             <a:tailEnd type="triangle"/>
           </a:ln>
@@ -12494,7 +12768,7 @@
           <a:prstGeom prst="straightConnector1">
             <a:avLst/>
           </a:prstGeom>
-          <a:ln>
+          <a:ln w="19050">
             <a:prstDash val="dash"/>
             <a:tailEnd type="triangle"/>
           </a:ln>
@@ -12993,7 +13267,7 @@
                             </p:stCondLst>
                             <p:childTnLst>
                               <p:par>
-                                <p:cTn id="29" presetID="14" presetClass="entr" presetSubtype="10" fill="hold" nodeType="clickEffect">
+                                <p:cTn id="29" presetID="6" presetClass="entr" presetSubtype="16" fill="hold" grpId="0" nodeType="clickEffect">
                                   <p:stCondLst>
                                     <p:cond delay="0"/>
                                   </p:stCondLst>
@@ -13006,7 +13280,7 @@
                                           </p:stCondLst>
                                         </p:cTn>
                                         <p:tgtEl>
-                                          <p:spTgt spid="8"/>
+                                          <p:spTgt spid="3"/>
                                         </p:tgtEl>
                                         <p:attrNameLst>
                                           <p:attrName>style.visibility</p:attrName>
@@ -13016,11 +13290,11 @@
                                         <p:strVal val="visible"/>
                                       </p:to>
                                     </p:set>
-                                    <p:animEffect transition="in" filter="randombar(horizontal)">
+                                    <p:animEffect transition="in" filter="circle(in)">
                                       <p:cBhvr>
-                                        <p:cTn id="31" dur="500"/>
+                                        <p:cTn id="31" dur="2000"/>
                                         <p:tgtEl>
-                                          <p:spTgt spid="8"/>
+                                          <p:spTgt spid="3"/>
                                         </p:tgtEl>
                                       </p:cBhvr>
                                     </p:animEffect>
@@ -13059,7 +13333,7 @@
                                           </p:stCondLst>
                                         </p:cTn>
                                         <p:tgtEl>
-                                          <p:spTgt spid="86"/>
+                                          <p:spTgt spid="8"/>
                                         </p:tgtEl>
                                         <p:attrNameLst>
                                           <p:attrName>style.visibility</p:attrName>
@@ -13073,6 +13347,59 @@
                                       <p:cBhvr>
                                         <p:cTn id="36" dur="500"/>
                                         <p:tgtEl>
+                                          <p:spTgt spid="8"/>
+                                        </p:tgtEl>
+                                      </p:cBhvr>
+                                    </p:animEffect>
+                                  </p:childTnLst>
+                                </p:cTn>
+                              </p:par>
+                            </p:childTnLst>
+                          </p:cTn>
+                        </p:par>
+                      </p:childTnLst>
+                    </p:cTn>
+                  </p:par>
+                  <p:par>
+                    <p:cTn id="37" fill="hold">
+                      <p:stCondLst>
+                        <p:cond delay="indefinite"/>
+                      </p:stCondLst>
+                      <p:childTnLst>
+                        <p:par>
+                          <p:cTn id="38" fill="hold">
+                            <p:stCondLst>
+                              <p:cond delay="0"/>
+                            </p:stCondLst>
+                            <p:childTnLst>
+                              <p:par>
+                                <p:cTn id="39" presetID="14" presetClass="entr" presetSubtype="10" fill="hold" nodeType="clickEffect">
+                                  <p:stCondLst>
+                                    <p:cond delay="0"/>
+                                  </p:stCondLst>
+                                  <p:childTnLst>
+                                    <p:set>
+                                      <p:cBhvr>
+                                        <p:cTn id="40" dur="1" fill="hold">
+                                          <p:stCondLst>
+                                            <p:cond delay="0"/>
+                                          </p:stCondLst>
+                                        </p:cTn>
+                                        <p:tgtEl>
+                                          <p:spTgt spid="86"/>
+                                        </p:tgtEl>
+                                        <p:attrNameLst>
+                                          <p:attrName>style.visibility</p:attrName>
+                                        </p:attrNameLst>
+                                      </p:cBhvr>
+                                      <p:to>
+                                        <p:strVal val="visible"/>
+                                      </p:to>
+                                    </p:set>
+                                    <p:animEffect transition="in" filter="randombar(horizontal)">
+                                      <p:cBhvr>
+                                        <p:cTn id="41" dur="500"/>
+                                        <p:tgtEl>
                                           <p:spTgt spid="86"/>
                                         </p:tgtEl>
                                       </p:cBhvr>
@@ -13081,14 +13408,14 @@
                                 </p:cTn>
                               </p:par>
                               <p:par>
-                                <p:cTn id="37" presetID="14" presetClass="entr" presetSubtype="10" fill="hold" grpId="0" nodeType="withEffect">
+                                <p:cTn id="42" presetID="14" presetClass="entr" presetSubtype="10" fill="hold" grpId="0" nodeType="withEffect">
                                   <p:stCondLst>
                                     <p:cond delay="0"/>
                                   </p:stCondLst>
                                   <p:childTnLst>
                                     <p:set>
                                       <p:cBhvr>
-                                        <p:cTn id="38" dur="1" fill="hold">
+                                        <p:cTn id="43" dur="1" fill="hold">
                                           <p:stCondLst>
                                             <p:cond delay="0"/>
                                           </p:stCondLst>
@@ -13106,7 +13433,7 @@
                                     </p:set>
                                     <p:animEffect transition="in" filter="randombar(horizontal)">
                                       <p:cBhvr>
-                                        <p:cTn id="39" dur="500"/>
+                                        <p:cTn id="44" dur="500"/>
                                         <p:tgtEl>
                                           <p:spTgt spid="7"/>
                                         </p:tgtEl>
@@ -13119,20 +13446,20 @@
                           </p:cTn>
                         </p:par>
                         <p:par>
-                          <p:cTn id="40" fill="hold">
+                          <p:cTn id="45" fill="hold">
                             <p:stCondLst>
                               <p:cond delay="500"/>
                             </p:stCondLst>
                             <p:childTnLst>
                               <p:par>
-                                <p:cTn id="41" presetID="14" presetClass="entr" presetSubtype="10" fill="hold" grpId="0" nodeType="afterEffect">
+                                <p:cTn id="46" presetID="14" presetClass="entr" presetSubtype="10" fill="hold" grpId="0" nodeType="afterEffect">
                                   <p:stCondLst>
                                     <p:cond delay="0"/>
                                   </p:stCondLst>
                                   <p:childTnLst>
                                     <p:set>
                                       <p:cBhvr>
-                                        <p:cTn id="42" dur="1" fill="hold">
+                                        <p:cTn id="47" dur="1" fill="hold">
                                           <p:stCondLst>
                                             <p:cond delay="0"/>
                                           </p:stCondLst>
@@ -13150,7 +13477,7 @@
                                     </p:set>
                                     <p:animEffect transition="in" filter="randombar(horizontal)">
                                       <p:cBhvr>
-                                        <p:cTn id="43" dur="500"/>
+                                        <p:cTn id="48" dur="500"/>
                                         <p:tgtEl>
                                           <p:spTgt spid="175"/>
                                         </p:tgtEl>
@@ -13163,20 +13490,20 @@
                           </p:cTn>
                         </p:par>
                         <p:par>
-                          <p:cTn id="44" fill="hold">
+                          <p:cTn id="49" fill="hold">
                             <p:stCondLst>
                               <p:cond delay="1000"/>
                             </p:stCondLst>
                             <p:childTnLst>
                               <p:par>
-                                <p:cTn id="45" presetID="14" presetClass="entr" presetSubtype="10" fill="hold" grpId="0" nodeType="afterEffect">
+                                <p:cTn id="50" presetID="14" presetClass="entr" presetSubtype="10" fill="hold" grpId="0" nodeType="afterEffect">
                                   <p:stCondLst>
                                     <p:cond delay="0"/>
                                   </p:stCondLst>
                                   <p:childTnLst>
                                     <p:set>
                                       <p:cBhvr>
-                                        <p:cTn id="46" dur="1" fill="hold">
+                                        <p:cTn id="51" dur="1" fill="hold">
                                           <p:stCondLst>
                                             <p:cond delay="0"/>
                                           </p:stCondLst>
@@ -13194,62 +13521,9 @@
                                     </p:set>
                                     <p:animEffect transition="in" filter="randombar(horizontal)">
                                       <p:cBhvr>
-                                        <p:cTn id="47" dur="500"/>
+                                        <p:cTn id="52" dur="500"/>
                                         <p:tgtEl>
                                           <p:spTgt spid="58"/>
-                                        </p:tgtEl>
-                                      </p:cBhvr>
-                                    </p:animEffect>
-                                  </p:childTnLst>
-                                </p:cTn>
-                              </p:par>
-                            </p:childTnLst>
-                          </p:cTn>
-                        </p:par>
-                      </p:childTnLst>
-                    </p:cTn>
-                  </p:par>
-                  <p:par>
-                    <p:cTn id="48" fill="hold">
-                      <p:stCondLst>
-                        <p:cond delay="indefinite"/>
-                      </p:stCondLst>
-                      <p:childTnLst>
-                        <p:par>
-                          <p:cTn id="49" fill="hold">
-                            <p:stCondLst>
-                              <p:cond delay="0"/>
-                            </p:stCondLst>
-                            <p:childTnLst>
-                              <p:par>
-                                <p:cTn id="50" presetID="14" presetClass="entr" presetSubtype="10" fill="hold" nodeType="clickEffect">
-                                  <p:stCondLst>
-                                    <p:cond delay="0"/>
-                                  </p:stCondLst>
-                                  <p:childTnLst>
-                                    <p:set>
-                                      <p:cBhvr>
-                                        <p:cTn id="51" dur="1" fill="hold">
-                                          <p:stCondLst>
-                                            <p:cond delay="0"/>
-                                          </p:stCondLst>
-                                        </p:cTn>
-                                        <p:tgtEl>
-                                          <p:spTgt spid="9"/>
-                                        </p:tgtEl>
-                                        <p:attrNameLst>
-                                          <p:attrName>style.visibility</p:attrName>
-                                        </p:attrNameLst>
-                                      </p:cBhvr>
-                                      <p:to>
-                                        <p:strVal val="visible"/>
-                                      </p:to>
-                                    </p:set>
-                                    <p:animEffect transition="in" filter="randombar(horizontal)">
-                                      <p:cBhvr>
-                                        <p:cTn id="52" dur="500"/>
-                                        <p:tgtEl>
-                                          <p:spTgt spid="9"/>
                                         </p:tgtEl>
                                       </p:cBhvr>
                                     </p:animEffect>
@@ -13275,7 +13549,7 @@
                             </p:stCondLst>
                             <p:childTnLst>
                               <p:par>
-                                <p:cTn id="55" presetID="14" presetClass="entr" presetSubtype="10" fill="hold" grpId="0" nodeType="clickEffect">
+                                <p:cTn id="55" presetID="14" presetClass="entr" presetSubtype="10" fill="hold" nodeType="clickEffect">
                                   <p:stCondLst>
                                     <p:cond delay="0"/>
                                   </p:stCondLst>
@@ -13288,7 +13562,7 @@
                                           </p:stCondLst>
                                         </p:cTn>
                                         <p:tgtEl>
-                                          <p:spTgt spid="97"/>
+                                          <p:spTgt spid="9"/>
                                         </p:tgtEl>
                                         <p:attrNameLst>
                                           <p:attrName>style.visibility</p:attrName>
@@ -13302,7 +13576,7 @@
                                       <p:cBhvr>
                                         <p:cTn id="57" dur="500"/>
                                         <p:tgtEl>
-                                          <p:spTgt spid="97"/>
+                                          <p:spTgt spid="9"/>
                                         </p:tgtEl>
                                       </p:cBhvr>
                                     </p:animEffect>
@@ -13341,6 +13615,59 @@
                                           </p:stCondLst>
                                         </p:cTn>
                                         <p:tgtEl>
+                                          <p:spTgt spid="97"/>
+                                        </p:tgtEl>
+                                        <p:attrNameLst>
+                                          <p:attrName>style.visibility</p:attrName>
+                                        </p:attrNameLst>
+                                      </p:cBhvr>
+                                      <p:to>
+                                        <p:strVal val="visible"/>
+                                      </p:to>
+                                    </p:set>
+                                    <p:animEffect transition="in" filter="randombar(horizontal)">
+                                      <p:cBhvr>
+                                        <p:cTn id="62" dur="500"/>
+                                        <p:tgtEl>
+                                          <p:spTgt spid="97"/>
+                                        </p:tgtEl>
+                                      </p:cBhvr>
+                                    </p:animEffect>
+                                  </p:childTnLst>
+                                </p:cTn>
+                              </p:par>
+                            </p:childTnLst>
+                          </p:cTn>
+                        </p:par>
+                      </p:childTnLst>
+                    </p:cTn>
+                  </p:par>
+                  <p:par>
+                    <p:cTn id="63" fill="hold">
+                      <p:stCondLst>
+                        <p:cond delay="indefinite"/>
+                      </p:stCondLst>
+                      <p:childTnLst>
+                        <p:par>
+                          <p:cTn id="64" fill="hold">
+                            <p:stCondLst>
+                              <p:cond delay="0"/>
+                            </p:stCondLst>
+                            <p:childTnLst>
+                              <p:par>
+                                <p:cTn id="65" presetID="14" presetClass="entr" presetSubtype="10" fill="hold" grpId="0" nodeType="clickEffect">
+                                  <p:stCondLst>
+                                    <p:cond delay="0"/>
+                                  </p:stCondLst>
+                                  <p:childTnLst>
+                                    <p:set>
+                                      <p:cBhvr>
+                                        <p:cTn id="66" dur="1" fill="hold">
+                                          <p:stCondLst>
+                                            <p:cond delay="0"/>
+                                          </p:stCondLst>
+                                        </p:cTn>
+                                        <p:tgtEl>
                                           <p:spTgt spid="48">
                                             <p:graphicEl>
                                               <a:dgm id="{2BFCCCDE-A52C-48E7-A8F0-906AEEBD4652}"/>
@@ -13357,7 +13684,7 @@
                                     </p:set>
                                     <p:animEffect transition="in" filter="randombar(horizontal)">
                                       <p:cBhvr>
-                                        <p:cTn id="62" dur="500"/>
+                                        <p:cTn id="67" dur="500"/>
                                         <p:tgtEl>
                                           <p:spTgt spid="48">
                                             <p:graphicEl>
@@ -13371,14 +13698,14 @@
                                 </p:cTn>
                               </p:par>
                               <p:par>
-                                <p:cTn id="63" presetID="14" presetClass="entr" presetSubtype="10" fill="hold" grpId="0" nodeType="withEffect">
+                                <p:cTn id="68" presetID="14" presetClass="entr" presetSubtype="10" fill="hold" grpId="0" nodeType="withEffect">
                                   <p:stCondLst>
                                     <p:cond delay="0"/>
                                   </p:stCondLst>
                                   <p:childTnLst>
                                     <p:set>
                                       <p:cBhvr>
-                                        <p:cTn id="64" dur="1" fill="hold">
+                                        <p:cTn id="69" dur="1" fill="hold">
                                           <p:stCondLst>
                                             <p:cond delay="0"/>
                                           </p:stCondLst>
@@ -13400,7 +13727,7 @@
                                     </p:set>
                                     <p:animEffect transition="in" filter="randombar(horizontal)">
                                       <p:cBhvr>
-                                        <p:cTn id="65" dur="500"/>
+                                        <p:cTn id="70" dur="500"/>
                                         <p:tgtEl>
                                           <p:spTgt spid="48">
                                             <p:graphicEl>
@@ -13414,14 +13741,14 @@
                                 </p:cTn>
                               </p:par>
                               <p:par>
-                                <p:cTn id="66" presetID="14" presetClass="entr" presetSubtype="10" fill="hold" grpId="0" nodeType="withEffect">
+                                <p:cTn id="71" presetID="14" presetClass="entr" presetSubtype="10" fill="hold" grpId="0" nodeType="withEffect">
                                   <p:stCondLst>
                                     <p:cond delay="0"/>
                                   </p:stCondLst>
                                   <p:childTnLst>
                                     <p:set>
                                       <p:cBhvr>
-                                        <p:cTn id="67" dur="1" fill="hold">
+                                        <p:cTn id="72" dur="1" fill="hold">
                                           <p:stCondLst>
                                             <p:cond delay="0"/>
                                           </p:stCondLst>
@@ -13443,7 +13770,7 @@
                                     </p:set>
                                     <p:animEffect transition="in" filter="randombar(horizontal)">
                                       <p:cBhvr>
-                                        <p:cTn id="68" dur="500"/>
+                                        <p:cTn id="73" dur="500"/>
                                         <p:tgtEl>
                                           <p:spTgt spid="48">
                                             <p:graphicEl>
@@ -13457,14 +13784,14 @@
                                 </p:cTn>
                               </p:par>
                               <p:par>
-                                <p:cTn id="69" presetID="14" presetClass="entr" presetSubtype="10" fill="hold" grpId="0" nodeType="withEffect">
+                                <p:cTn id="74" presetID="14" presetClass="entr" presetSubtype="10" fill="hold" grpId="0" nodeType="withEffect">
                                   <p:stCondLst>
                                     <p:cond delay="0"/>
                                   </p:stCondLst>
                                   <p:childTnLst>
                                     <p:set>
                                       <p:cBhvr>
-                                        <p:cTn id="70" dur="1" fill="hold">
+                                        <p:cTn id="75" dur="1" fill="hold">
                                           <p:stCondLst>
                                             <p:cond delay="0"/>
                                           </p:stCondLst>
@@ -13486,7 +13813,7 @@
                                     </p:set>
                                     <p:animEffect transition="in" filter="randombar(horizontal)">
                                       <p:cBhvr>
-                                        <p:cTn id="71" dur="500"/>
+                                        <p:cTn id="76" dur="500"/>
                                         <p:tgtEl>
                                           <p:spTgt spid="48">
                                             <p:graphicEl>
@@ -13500,14 +13827,14 @@
                                 </p:cTn>
                               </p:par>
                               <p:par>
-                                <p:cTn id="72" presetID="14" presetClass="entr" presetSubtype="10" fill="hold" grpId="0" nodeType="withEffect">
+                                <p:cTn id="77" presetID="14" presetClass="entr" presetSubtype="10" fill="hold" grpId="0" nodeType="withEffect">
                                   <p:stCondLst>
                                     <p:cond delay="0"/>
                                   </p:stCondLst>
                                   <p:childTnLst>
                                     <p:set>
                                       <p:cBhvr>
-                                        <p:cTn id="73" dur="1" fill="hold">
+                                        <p:cTn id="78" dur="1" fill="hold">
                                           <p:stCondLst>
                                             <p:cond delay="0"/>
                                           </p:stCondLst>
@@ -13529,7 +13856,7 @@
                                     </p:set>
                                     <p:animEffect transition="in" filter="randombar(horizontal)">
                                       <p:cBhvr>
-                                        <p:cTn id="74" dur="500"/>
+                                        <p:cTn id="79" dur="500"/>
                                         <p:tgtEl>
                                           <p:spTgt spid="48">
                                             <p:graphicEl>
@@ -13543,14 +13870,14 @@
                                 </p:cTn>
                               </p:par>
                               <p:par>
-                                <p:cTn id="75" presetID="14" presetClass="entr" presetSubtype="10" fill="hold" grpId="0" nodeType="withEffect">
+                                <p:cTn id="80" presetID="14" presetClass="entr" presetSubtype="10" fill="hold" grpId="0" nodeType="withEffect">
                                   <p:stCondLst>
                                     <p:cond delay="0"/>
                                   </p:stCondLst>
                                   <p:childTnLst>
                                     <p:set>
                                       <p:cBhvr>
-                                        <p:cTn id="76" dur="1" fill="hold">
+                                        <p:cTn id="81" dur="1" fill="hold">
                                           <p:stCondLst>
                                             <p:cond delay="0"/>
                                           </p:stCondLst>
@@ -13572,7 +13899,7 @@
                                     </p:set>
                                     <p:animEffect transition="in" filter="randombar(horizontal)">
                                       <p:cBhvr>
-                                        <p:cTn id="77" dur="500"/>
+                                        <p:cTn id="82" dur="500"/>
                                         <p:tgtEl>
                                           <p:spTgt spid="48">
                                             <p:graphicEl>
@@ -13586,14 +13913,14 @@
                                 </p:cTn>
                               </p:par>
                               <p:par>
-                                <p:cTn id="78" presetID="14" presetClass="entr" presetSubtype="10" fill="hold" grpId="0" nodeType="withEffect">
+                                <p:cTn id="83" presetID="14" presetClass="entr" presetSubtype="10" fill="hold" grpId="0" nodeType="withEffect">
                                   <p:stCondLst>
                                     <p:cond delay="0"/>
                                   </p:stCondLst>
                                   <p:childTnLst>
                                     <p:set>
                                       <p:cBhvr>
-                                        <p:cTn id="79" dur="1" fill="hold">
+                                        <p:cTn id="84" dur="1" fill="hold">
                                           <p:stCondLst>
                                             <p:cond delay="0"/>
                                           </p:stCondLst>
@@ -13615,7 +13942,7 @@
                                     </p:set>
                                     <p:animEffect transition="in" filter="randombar(horizontal)">
                                       <p:cBhvr>
-                                        <p:cTn id="80" dur="500"/>
+                                        <p:cTn id="85" dur="500"/>
                                         <p:tgtEl>
                                           <p:spTgt spid="48">
                                             <p:graphicEl>
@@ -13629,14 +13956,14 @@
                                 </p:cTn>
                               </p:par>
                               <p:par>
-                                <p:cTn id="81" presetID="14" presetClass="entr" presetSubtype="10" fill="hold" grpId="0" nodeType="withEffect">
+                                <p:cTn id="86" presetID="14" presetClass="entr" presetSubtype="10" fill="hold" grpId="0" nodeType="withEffect">
                                   <p:stCondLst>
                                     <p:cond delay="0"/>
                                   </p:stCondLst>
                                   <p:childTnLst>
                                     <p:set>
                                       <p:cBhvr>
-                                        <p:cTn id="82" dur="1" fill="hold">
+                                        <p:cTn id="87" dur="1" fill="hold">
                                           <p:stCondLst>
                                             <p:cond delay="0"/>
                                           </p:stCondLst>
@@ -13658,7 +13985,7 @@
                                     </p:set>
                                     <p:animEffect transition="in" filter="randombar(horizontal)">
                                       <p:cBhvr>
-                                        <p:cTn id="83" dur="500"/>
+                                        <p:cTn id="88" dur="500"/>
                                         <p:tgtEl>
                                           <p:spTgt spid="48">
                                             <p:graphicEl>
@@ -13672,14 +13999,14 @@
                                 </p:cTn>
                               </p:par>
                               <p:par>
-                                <p:cTn id="84" presetID="14" presetClass="entr" presetSubtype="10" fill="hold" grpId="0" nodeType="withEffect">
+                                <p:cTn id="89" presetID="14" presetClass="entr" presetSubtype="10" fill="hold" grpId="0" nodeType="withEffect">
                                   <p:stCondLst>
                                     <p:cond delay="0"/>
                                   </p:stCondLst>
                                   <p:childTnLst>
                                     <p:set>
                                       <p:cBhvr>
-                                        <p:cTn id="85" dur="1" fill="hold">
+                                        <p:cTn id="90" dur="1" fill="hold">
                                           <p:stCondLst>
                                             <p:cond delay="0"/>
                                           </p:stCondLst>
@@ -13701,7 +14028,7 @@
                                     </p:set>
                                     <p:animEffect transition="in" filter="randombar(horizontal)">
                                       <p:cBhvr>
-                                        <p:cTn id="86" dur="500"/>
+                                        <p:cTn id="91" dur="500"/>
                                         <p:tgtEl>
                                           <p:spTgt spid="48">
                                             <p:graphicEl>
@@ -13721,26 +14048,26 @@
                     </p:cTn>
                   </p:par>
                   <p:par>
-                    <p:cTn id="87" fill="hold">
+                    <p:cTn id="92" fill="hold">
                       <p:stCondLst>
                         <p:cond delay="indefinite"/>
                       </p:stCondLst>
                       <p:childTnLst>
                         <p:par>
-                          <p:cTn id="88" fill="hold">
+                          <p:cTn id="93" fill="hold">
                             <p:stCondLst>
                               <p:cond delay="0"/>
                             </p:stCondLst>
                             <p:childTnLst>
                               <p:par>
-                                <p:cTn id="89" presetID="14" presetClass="entr" presetSubtype="10" fill="hold" grpId="0" nodeType="clickEffect">
+                                <p:cTn id="94" presetID="14" presetClass="entr" presetSubtype="10" fill="hold" grpId="0" nodeType="clickEffect">
                                   <p:stCondLst>
                                     <p:cond delay="0"/>
                                   </p:stCondLst>
                                   <p:childTnLst>
                                     <p:set>
                                       <p:cBhvr>
-                                        <p:cTn id="90" dur="1" fill="hold">
+                                        <p:cTn id="95" dur="1" fill="hold">
                                           <p:stCondLst>
                                             <p:cond delay="0"/>
                                           </p:stCondLst>
@@ -13762,7 +14089,7 @@
                                     </p:set>
                                     <p:animEffect transition="in" filter="randombar(horizontal)">
                                       <p:cBhvr>
-                                        <p:cTn id="91" dur="500"/>
+                                        <p:cTn id="96" dur="500"/>
                                         <p:tgtEl>
                                           <p:spTgt spid="48">
                                             <p:graphicEl>
@@ -13776,14 +14103,14 @@
                                 </p:cTn>
                               </p:par>
                               <p:par>
-                                <p:cTn id="92" presetID="14" presetClass="entr" presetSubtype="10" fill="hold" grpId="0" nodeType="withEffect">
+                                <p:cTn id="97" presetID="14" presetClass="entr" presetSubtype="10" fill="hold" grpId="0" nodeType="withEffect">
                                   <p:stCondLst>
                                     <p:cond delay="0"/>
                                   </p:stCondLst>
                                   <p:childTnLst>
                                     <p:set>
                                       <p:cBhvr>
-                                        <p:cTn id="93" dur="1" fill="hold">
+                                        <p:cTn id="98" dur="1" fill="hold">
                                           <p:stCondLst>
                                             <p:cond delay="0"/>
                                           </p:stCondLst>
@@ -13805,7 +14132,7 @@
                                     </p:set>
                                     <p:animEffect transition="in" filter="randombar(horizontal)">
                                       <p:cBhvr>
-                                        <p:cTn id="94" dur="500"/>
+                                        <p:cTn id="99" dur="500"/>
                                         <p:tgtEl>
                                           <p:spTgt spid="48">
                                             <p:graphicEl>
@@ -13819,14 +14146,14 @@
                                 </p:cTn>
                               </p:par>
                               <p:par>
-                                <p:cTn id="95" presetID="14" presetClass="entr" presetSubtype="10" fill="hold" grpId="0" nodeType="withEffect">
+                                <p:cTn id="100" presetID="14" presetClass="entr" presetSubtype="10" fill="hold" grpId="0" nodeType="withEffect">
                                   <p:stCondLst>
                                     <p:cond delay="0"/>
                                   </p:stCondLst>
                                   <p:childTnLst>
                                     <p:set>
                                       <p:cBhvr>
-                                        <p:cTn id="96" dur="1" fill="hold">
+                                        <p:cTn id="101" dur="1" fill="hold">
                                           <p:stCondLst>
                                             <p:cond delay="0"/>
                                           </p:stCondLst>
@@ -13848,7 +14175,7 @@
                                     </p:set>
                                     <p:animEffect transition="in" filter="randombar(horizontal)">
                                       <p:cBhvr>
-                                        <p:cTn id="97" dur="500"/>
+                                        <p:cTn id="102" dur="500"/>
                                         <p:tgtEl>
                                           <p:spTgt spid="48">
                                             <p:graphicEl>
@@ -13862,14 +14189,14 @@
                                 </p:cTn>
                               </p:par>
                               <p:par>
-                                <p:cTn id="98" presetID="14" presetClass="entr" presetSubtype="10" fill="hold" grpId="0" nodeType="withEffect">
+                                <p:cTn id="103" presetID="14" presetClass="entr" presetSubtype="10" fill="hold" grpId="0" nodeType="withEffect">
                                   <p:stCondLst>
                                     <p:cond delay="0"/>
                                   </p:stCondLst>
                                   <p:childTnLst>
                                     <p:set>
                                       <p:cBhvr>
-                                        <p:cTn id="99" dur="1" fill="hold">
+                                        <p:cTn id="104" dur="1" fill="hold">
                                           <p:stCondLst>
                                             <p:cond delay="0"/>
                                           </p:stCondLst>
@@ -13891,7 +14218,7 @@
                                     </p:set>
                                     <p:animEffect transition="in" filter="randombar(horizontal)">
                                       <p:cBhvr>
-                                        <p:cTn id="100" dur="500"/>
+                                        <p:cTn id="105" dur="500"/>
                                         <p:tgtEl>
                                           <p:spTgt spid="48">
                                             <p:graphicEl>
@@ -13905,14 +14232,14 @@
                                 </p:cTn>
                               </p:par>
                               <p:par>
-                                <p:cTn id="101" presetID="14" presetClass="entr" presetSubtype="10" fill="hold" grpId="0" nodeType="withEffect">
+                                <p:cTn id="106" presetID="14" presetClass="entr" presetSubtype="10" fill="hold" grpId="0" nodeType="withEffect">
                                   <p:stCondLst>
                                     <p:cond delay="0"/>
                                   </p:stCondLst>
                                   <p:childTnLst>
                                     <p:set>
                                       <p:cBhvr>
-                                        <p:cTn id="102" dur="1" fill="hold">
+                                        <p:cTn id="107" dur="1" fill="hold">
                                           <p:stCondLst>
                                             <p:cond delay="0"/>
                                           </p:stCondLst>
@@ -13934,7 +14261,7 @@
                                     </p:set>
                                     <p:animEffect transition="in" filter="randombar(horizontal)">
                                       <p:cBhvr>
-                                        <p:cTn id="103" dur="500"/>
+                                        <p:cTn id="108" dur="500"/>
                                         <p:tgtEl>
                                           <p:spTgt spid="48">
                                             <p:graphicEl>
@@ -13948,14 +14275,14 @@
                                 </p:cTn>
                               </p:par>
                               <p:par>
-                                <p:cTn id="104" presetID="14" presetClass="entr" presetSubtype="10" fill="hold" grpId="0" nodeType="withEffect">
+                                <p:cTn id="109" presetID="14" presetClass="entr" presetSubtype="10" fill="hold" grpId="0" nodeType="withEffect">
                                   <p:stCondLst>
                                     <p:cond delay="0"/>
                                   </p:stCondLst>
                                   <p:childTnLst>
                                     <p:set>
                                       <p:cBhvr>
-                                        <p:cTn id="105" dur="1" fill="hold">
+                                        <p:cTn id="110" dur="1" fill="hold">
                                           <p:stCondLst>
                                             <p:cond delay="0"/>
                                           </p:stCondLst>
@@ -13977,7 +14304,7 @@
                                     </p:set>
                                     <p:animEffect transition="in" filter="randombar(horizontal)">
                                       <p:cBhvr>
-                                        <p:cTn id="106" dur="500"/>
+                                        <p:cTn id="111" dur="500"/>
                                         <p:tgtEl>
                                           <p:spTgt spid="48">
                                             <p:graphicEl>
@@ -13991,14 +14318,14 @@
                                 </p:cTn>
                               </p:par>
                               <p:par>
-                                <p:cTn id="107" presetID="14" presetClass="entr" presetSubtype="10" fill="hold" grpId="0" nodeType="withEffect">
+                                <p:cTn id="112" presetID="14" presetClass="entr" presetSubtype="10" fill="hold" grpId="0" nodeType="withEffect">
                                   <p:stCondLst>
                                     <p:cond delay="0"/>
                                   </p:stCondLst>
                                   <p:childTnLst>
                                     <p:set>
                                       <p:cBhvr>
-                                        <p:cTn id="108" dur="1" fill="hold">
+                                        <p:cTn id="113" dur="1" fill="hold">
                                           <p:stCondLst>
                                             <p:cond delay="0"/>
                                           </p:stCondLst>
@@ -14020,7 +14347,7 @@
                                     </p:set>
                                     <p:animEffect transition="in" filter="randombar(horizontal)">
                                       <p:cBhvr>
-                                        <p:cTn id="109" dur="500"/>
+                                        <p:cTn id="114" dur="500"/>
                                         <p:tgtEl>
                                           <p:spTgt spid="48">
                                             <p:graphicEl>
@@ -14034,14 +14361,14 @@
                                 </p:cTn>
                               </p:par>
                               <p:par>
-                                <p:cTn id="110" presetID="14" presetClass="entr" presetSubtype="10" fill="hold" grpId="0" nodeType="withEffect">
+                                <p:cTn id="115" presetID="14" presetClass="entr" presetSubtype="10" fill="hold" grpId="0" nodeType="withEffect">
                                   <p:stCondLst>
                                     <p:cond delay="0"/>
                                   </p:stCondLst>
                                   <p:childTnLst>
                                     <p:set>
                                       <p:cBhvr>
-                                        <p:cTn id="111" dur="1" fill="hold">
+                                        <p:cTn id="116" dur="1" fill="hold">
                                           <p:stCondLst>
                                             <p:cond delay="0"/>
                                           </p:stCondLst>
@@ -14063,7 +14390,7 @@
                                     </p:set>
                                     <p:animEffect transition="in" filter="randombar(horizontal)">
                                       <p:cBhvr>
-                                        <p:cTn id="112" dur="500"/>
+                                        <p:cTn id="117" dur="500"/>
                                         <p:tgtEl>
                                           <p:spTgt spid="48">
                                             <p:graphicEl>
@@ -14077,14 +14404,14 @@
                                 </p:cTn>
                               </p:par>
                               <p:par>
-                                <p:cTn id="113" presetID="14" presetClass="entr" presetSubtype="10" fill="hold" grpId="0" nodeType="withEffect">
+                                <p:cTn id="118" presetID="14" presetClass="entr" presetSubtype="10" fill="hold" grpId="0" nodeType="withEffect">
                                   <p:stCondLst>
                                     <p:cond delay="0"/>
                                   </p:stCondLst>
                                   <p:childTnLst>
                                     <p:set>
                                       <p:cBhvr>
-                                        <p:cTn id="114" dur="1" fill="hold">
+                                        <p:cTn id="119" dur="1" fill="hold">
                                           <p:stCondLst>
                                             <p:cond delay="0"/>
                                           </p:stCondLst>
@@ -14106,7 +14433,7 @@
                                     </p:set>
                                     <p:animEffect transition="in" filter="randombar(horizontal)">
                                       <p:cBhvr>
-                                        <p:cTn id="115" dur="500"/>
+                                        <p:cTn id="120" dur="500"/>
                                         <p:tgtEl>
                                           <p:spTgt spid="48">
                                             <p:graphicEl>
@@ -14126,26 +14453,26 @@
                     </p:cTn>
                   </p:par>
                   <p:par>
-                    <p:cTn id="116" fill="hold">
+                    <p:cTn id="121" fill="hold">
                       <p:stCondLst>
                         <p:cond delay="indefinite"/>
                       </p:stCondLst>
                       <p:childTnLst>
                         <p:par>
-                          <p:cTn id="117" fill="hold">
+                          <p:cTn id="122" fill="hold">
                             <p:stCondLst>
                               <p:cond delay="0"/>
                             </p:stCondLst>
                             <p:childTnLst>
                               <p:par>
-                                <p:cTn id="118" presetID="14" presetClass="entr" presetSubtype="10" fill="hold" grpId="0" nodeType="clickEffect">
+                                <p:cTn id="123" presetID="14" presetClass="entr" presetSubtype="10" fill="hold" grpId="0" nodeType="clickEffect">
                                   <p:stCondLst>
                                     <p:cond delay="0"/>
                                   </p:stCondLst>
                                   <p:childTnLst>
                                     <p:set>
                                       <p:cBhvr>
-                                        <p:cTn id="119" dur="1" fill="hold">
+                                        <p:cTn id="124" dur="1" fill="hold">
                                           <p:stCondLst>
                                             <p:cond delay="0"/>
                                           </p:stCondLst>
@@ -14167,7 +14494,7 @@
                                     </p:set>
                                     <p:animEffect transition="in" filter="randombar(horizontal)">
                                       <p:cBhvr>
-                                        <p:cTn id="120" dur="500"/>
+                                        <p:cTn id="125" dur="500"/>
                                         <p:tgtEl>
                                           <p:spTgt spid="48">
                                             <p:graphicEl>
@@ -14181,14 +14508,14 @@
                                 </p:cTn>
                               </p:par>
                               <p:par>
-                                <p:cTn id="121" presetID="14" presetClass="entr" presetSubtype="10" fill="hold" grpId="0" nodeType="withEffect">
+                                <p:cTn id="126" presetID="14" presetClass="entr" presetSubtype="10" fill="hold" grpId="0" nodeType="withEffect">
                                   <p:stCondLst>
                                     <p:cond delay="0"/>
                                   </p:stCondLst>
                                   <p:childTnLst>
                                     <p:set>
                                       <p:cBhvr>
-                                        <p:cTn id="122" dur="1" fill="hold">
+                                        <p:cTn id="127" dur="1" fill="hold">
                                           <p:stCondLst>
                                             <p:cond delay="0"/>
                                           </p:stCondLst>
@@ -14210,7 +14537,7 @@
                                     </p:set>
                                     <p:animEffect transition="in" filter="randombar(horizontal)">
                                       <p:cBhvr>
-                                        <p:cTn id="123" dur="500"/>
+                                        <p:cTn id="128" dur="500"/>
                                         <p:tgtEl>
                                           <p:spTgt spid="48">
                                             <p:graphicEl>
@@ -14224,14 +14551,14 @@
                                 </p:cTn>
                               </p:par>
                               <p:par>
-                                <p:cTn id="124" presetID="14" presetClass="entr" presetSubtype="10" fill="hold" grpId="0" nodeType="withEffect">
+                                <p:cTn id="129" presetID="14" presetClass="entr" presetSubtype="10" fill="hold" grpId="0" nodeType="withEffect">
                                   <p:stCondLst>
                                     <p:cond delay="0"/>
                                   </p:stCondLst>
                                   <p:childTnLst>
                                     <p:set>
                                       <p:cBhvr>
-                                        <p:cTn id="125" dur="1" fill="hold">
+                                        <p:cTn id="130" dur="1" fill="hold">
                                           <p:stCondLst>
                                             <p:cond delay="0"/>
                                           </p:stCondLst>
@@ -14253,7 +14580,7 @@
                                     </p:set>
                                     <p:animEffect transition="in" filter="randombar(horizontal)">
                                       <p:cBhvr>
-                                        <p:cTn id="126" dur="500"/>
+                                        <p:cTn id="131" dur="500"/>
                                         <p:tgtEl>
                                           <p:spTgt spid="48">
                                             <p:graphicEl>
@@ -14267,14 +14594,14 @@
                                 </p:cTn>
                               </p:par>
                               <p:par>
-                                <p:cTn id="127" presetID="14" presetClass="entr" presetSubtype="10" fill="hold" grpId="0" nodeType="withEffect">
+                                <p:cTn id="132" presetID="14" presetClass="entr" presetSubtype="10" fill="hold" grpId="0" nodeType="withEffect">
                                   <p:stCondLst>
                                     <p:cond delay="0"/>
                                   </p:stCondLst>
                                   <p:childTnLst>
                                     <p:set>
                                       <p:cBhvr>
-                                        <p:cTn id="128" dur="1" fill="hold">
+                                        <p:cTn id="133" dur="1" fill="hold">
                                           <p:stCondLst>
                                             <p:cond delay="0"/>
                                           </p:stCondLst>
@@ -14296,7 +14623,7 @@
                                     </p:set>
                                     <p:animEffect transition="in" filter="randombar(horizontal)">
                                       <p:cBhvr>
-                                        <p:cTn id="129" dur="500"/>
+                                        <p:cTn id="134" dur="500"/>
                                         <p:tgtEl>
                                           <p:spTgt spid="48">
                                             <p:graphicEl>
@@ -14310,14 +14637,14 @@
                                 </p:cTn>
                               </p:par>
                               <p:par>
-                                <p:cTn id="130" presetID="14" presetClass="entr" presetSubtype="10" fill="hold" grpId="0" nodeType="withEffect">
+                                <p:cTn id="135" presetID="14" presetClass="entr" presetSubtype="10" fill="hold" grpId="0" nodeType="withEffect">
                                   <p:stCondLst>
                                     <p:cond delay="0"/>
                                   </p:stCondLst>
                                   <p:childTnLst>
                                     <p:set>
                                       <p:cBhvr>
-                                        <p:cTn id="131" dur="1" fill="hold">
+                                        <p:cTn id="136" dur="1" fill="hold">
                                           <p:stCondLst>
                                             <p:cond delay="0"/>
                                           </p:stCondLst>
@@ -14339,7 +14666,7 @@
                                     </p:set>
                                     <p:animEffect transition="in" filter="randombar(horizontal)">
                                       <p:cBhvr>
-                                        <p:cTn id="132" dur="500"/>
+                                        <p:cTn id="137" dur="500"/>
                                         <p:tgtEl>
                                           <p:spTgt spid="48">
                                             <p:graphicEl>
@@ -14353,14 +14680,14 @@
                                 </p:cTn>
                               </p:par>
                               <p:par>
-                                <p:cTn id="133" presetID="14" presetClass="entr" presetSubtype="10" fill="hold" grpId="0" nodeType="withEffect">
+                                <p:cTn id="138" presetID="14" presetClass="entr" presetSubtype="10" fill="hold" grpId="0" nodeType="withEffect">
                                   <p:stCondLst>
                                     <p:cond delay="0"/>
                                   </p:stCondLst>
                                   <p:childTnLst>
                                     <p:set>
                                       <p:cBhvr>
-                                        <p:cTn id="134" dur="1" fill="hold">
+                                        <p:cTn id="139" dur="1" fill="hold">
                                           <p:stCondLst>
                                             <p:cond delay="0"/>
                                           </p:stCondLst>
@@ -14382,7 +14709,7 @@
                                     </p:set>
                                     <p:animEffect transition="in" filter="randombar(horizontal)">
                                       <p:cBhvr>
-                                        <p:cTn id="135" dur="500"/>
+                                        <p:cTn id="140" dur="500"/>
                                         <p:tgtEl>
                                           <p:spTgt spid="48">
                                             <p:graphicEl>
@@ -14396,14 +14723,14 @@
                                 </p:cTn>
                               </p:par>
                               <p:par>
-                                <p:cTn id="136" presetID="14" presetClass="entr" presetSubtype="10" fill="hold" grpId="0" nodeType="withEffect">
+                                <p:cTn id="141" presetID="14" presetClass="entr" presetSubtype="10" fill="hold" grpId="0" nodeType="withEffect">
                                   <p:stCondLst>
                                     <p:cond delay="0"/>
                                   </p:stCondLst>
                                   <p:childTnLst>
                                     <p:set>
                                       <p:cBhvr>
-                                        <p:cTn id="137" dur="1" fill="hold">
+                                        <p:cTn id="142" dur="1" fill="hold">
                                           <p:stCondLst>
                                             <p:cond delay="0"/>
                                           </p:stCondLst>
@@ -14425,7 +14752,7 @@
                                     </p:set>
                                     <p:animEffect transition="in" filter="randombar(horizontal)">
                                       <p:cBhvr>
-                                        <p:cTn id="138" dur="500"/>
+                                        <p:cTn id="143" dur="500"/>
                                         <p:tgtEl>
                                           <p:spTgt spid="48">
                                             <p:graphicEl>
@@ -14439,14 +14766,14 @@
                                 </p:cTn>
                               </p:par>
                               <p:par>
-                                <p:cTn id="139" presetID="14" presetClass="entr" presetSubtype="10" fill="hold" grpId="0" nodeType="withEffect">
+                                <p:cTn id="144" presetID="14" presetClass="entr" presetSubtype="10" fill="hold" grpId="0" nodeType="withEffect">
                                   <p:stCondLst>
                                     <p:cond delay="0"/>
                                   </p:stCondLst>
                                   <p:childTnLst>
                                     <p:set>
                                       <p:cBhvr>
-                                        <p:cTn id="140" dur="1" fill="hold">
+                                        <p:cTn id="145" dur="1" fill="hold">
                                           <p:stCondLst>
                                             <p:cond delay="0"/>
                                           </p:stCondLst>
@@ -14468,7 +14795,7 @@
                                     </p:set>
                                     <p:animEffect transition="in" filter="randombar(horizontal)">
                                       <p:cBhvr>
-                                        <p:cTn id="141" dur="500"/>
+                                        <p:cTn id="146" dur="500"/>
                                         <p:tgtEl>
                                           <p:spTgt spid="48">
                                             <p:graphicEl>
@@ -14482,14 +14809,14 @@
                                 </p:cTn>
                               </p:par>
                               <p:par>
-                                <p:cTn id="142" presetID="14" presetClass="entr" presetSubtype="10" fill="hold" grpId="0" nodeType="withEffect">
+                                <p:cTn id="147" presetID="14" presetClass="entr" presetSubtype="10" fill="hold" grpId="0" nodeType="withEffect">
                                   <p:stCondLst>
                                     <p:cond delay="0"/>
                                   </p:stCondLst>
                                   <p:childTnLst>
                                     <p:set>
                                       <p:cBhvr>
-                                        <p:cTn id="143" dur="1" fill="hold">
+                                        <p:cTn id="148" dur="1" fill="hold">
                                           <p:stCondLst>
                                             <p:cond delay="0"/>
                                           </p:stCondLst>
@@ -14511,7 +14838,7 @@
                                     </p:set>
                                     <p:animEffect transition="in" filter="randombar(horizontal)">
                                       <p:cBhvr>
-                                        <p:cTn id="144" dur="500"/>
+                                        <p:cTn id="149" dur="500"/>
                                         <p:tgtEl>
                                           <p:spTgt spid="48">
                                             <p:graphicEl>
@@ -14531,26 +14858,26 @@
                     </p:cTn>
                   </p:par>
                   <p:par>
-                    <p:cTn id="145" fill="hold">
+                    <p:cTn id="150" fill="hold">
                       <p:stCondLst>
                         <p:cond delay="indefinite"/>
                       </p:stCondLst>
                       <p:childTnLst>
                         <p:par>
-                          <p:cTn id="146" fill="hold">
+                          <p:cTn id="151" fill="hold">
                             <p:stCondLst>
                               <p:cond delay="0"/>
                             </p:stCondLst>
                             <p:childTnLst>
                               <p:par>
-                                <p:cTn id="147" presetID="14" presetClass="entr" presetSubtype="10" fill="hold" nodeType="clickEffect">
+                                <p:cTn id="152" presetID="22" presetClass="entr" presetSubtype="1" fill="hold" nodeType="clickEffect">
                                   <p:stCondLst>
                                     <p:cond delay="0"/>
                                   </p:stCondLst>
                                   <p:childTnLst>
                                     <p:set>
                                       <p:cBhvr>
-                                        <p:cTn id="148" dur="1" fill="hold">
+                                        <p:cTn id="153" dur="1" fill="hold">
                                           <p:stCondLst>
                                             <p:cond delay="0"/>
                                           </p:stCondLst>
@@ -14566,9 +14893,9 @@
                                         <p:strVal val="visible"/>
                                       </p:to>
                                     </p:set>
-                                    <p:animEffect transition="in" filter="randombar(horizontal)">
+                                    <p:animEffect transition="in" filter="wipe(up)">
                                       <p:cBhvr>
-                                        <p:cTn id="149" dur="500"/>
+                                        <p:cTn id="154" dur="500"/>
                                         <p:tgtEl>
                                           <p:spTgt spid="163"/>
                                         </p:tgtEl>
@@ -14578,14 +14905,14 @@
                                 </p:cTn>
                               </p:par>
                               <p:par>
-                                <p:cTn id="150" presetID="14" presetClass="entr" presetSubtype="10" fill="hold" nodeType="withEffect">
+                                <p:cTn id="155" presetID="22" presetClass="entr" presetSubtype="1" fill="hold" nodeType="withEffect">
                                   <p:stCondLst>
                                     <p:cond delay="0"/>
                                   </p:stCondLst>
                                   <p:childTnLst>
                                     <p:set>
                                       <p:cBhvr>
-                                        <p:cTn id="151" dur="1" fill="hold">
+                                        <p:cTn id="156" dur="1" fill="hold">
                                           <p:stCondLst>
                                             <p:cond delay="0"/>
                                           </p:stCondLst>
@@ -14601,9 +14928,9 @@
                                         <p:strVal val="visible"/>
                                       </p:to>
                                     </p:set>
-                                    <p:animEffect transition="in" filter="randombar(horizontal)">
+                                    <p:animEffect transition="in" filter="wipe(up)">
                                       <p:cBhvr>
-                                        <p:cTn id="152" dur="500"/>
+                                        <p:cTn id="157" dur="500"/>
                                         <p:tgtEl>
                                           <p:spTgt spid="65"/>
                                         </p:tgtEl>
@@ -14619,26 +14946,26 @@
                     </p:cTn>
                   </p:par>
                   <p:par>
-                    <p:cTn id="153" fill="hold">
+                    <p:cTn id="158" fill="hold">
                       <p:stCondLst>
                         <p:cond delay="indefinite"/>
                       </p:stCondLst>
                       <p:childTnLst>
                         <p:par>
-                          <p:cTn id="154" fill="hold">
+                          <p:cTn id="159" fill="hold">
                             <p:stCondLst>
                               <p:cond delay="0"/>
                             </p:stCondLst>
                             <p:childTnLst>
                               <p:par>
-                                <p:cTn id="155" presetID="14" presetClass="entr" presetSubtype="10" fill="hold" nodeType="clickEffect">
+                                <p:cTn id="160" presetID="14" presetClass="entr" presetSubtype="10" fill="hold" nodeType="clickEffect">
                                   <p:stCondLst>
                                     <p:cond delay="0"/>
                                   </p:stCondLst>
                                   <p:childTnLst>
                                     <p:set>
                                       <p:cBhvr>
-                                        <p:cTn id="156" dur="1" fill="hold">
+                                        <p:cTn id="161" dur="1" fill="hold">
                                           <p:stCondLst>
                                             <p:cond delay="0"/>
                                           </p:stCondLst>
@@ -14656,7 +14983,7 @@
                                     </p:set>
                                     <p:animEffect transition="in" filter="randombar(horizontal)">
                                       <p:cBhvr>
-                                        <p:cTn id="157" dur="500"/>
+                                        <p:cTn id="162" dur="500"/>
                                         <p:tgtEl>
                                           <p:spTgt spid="41"/>
                                         </p:tgtEl>
@@ -14669,20 +14996,20 @@
                           </p:cTn>
                         </p:par>
                         <p:par>
-                          <p:cTn id="158" fill="hold">
+                          <p:cTn id="163" fill="hold">
                             <p:stCondLst>
                               <p:cond delay="500"/>
                             </p:stCondLst>
                             <p:childTnLst>
                               <p:par>
-                                <p:cTn id="159" presetID="14" presetClass="entr" presetSubtype="10" fill="hold" grpId="0" nodeType="afterEffect">
+                                <p:cTn id="164" presetID="14" presetClass="entr" presetSubtype="10" fill="hold" grpId="0" nodeType="afterEffect">
                                   <p:stCondLst>
                                     <p:cond delay="0"/>
                                   </p:stCondLst>
                                   <p:childTnLst>
                                     <p:set>
                                       <p:cBhvr>
-                                        <p:cTn id="160" dur="1" fill="hold">
+                                        <p:cTn id="165" dur="1" fill="hold">
                                           <p:stCondLst>
                                             <p:cond delay="0"/>
                                           </p:stCondLst>
@@ -14700,7 +15027,7 @@
                                     </p:set>
                                     <p:animEffect transition="in" filter="randombar(horizontal)">
                                       <p:cBhvr>
-                                        <p:cTn id="161" dur="500"/>
+                                        <p:cTn id="166" dur="500"/>
                                         <p:tgtEl>
                                           <p:spTgt spid="38"/>
                                         </p:tgtEl>
@@ -14713,20 +15040,20 @@
                           </p:cTn>
                         </p:par>
                         <p:par>
-                          <p:cTn id="162" fill="hold">
+                          <p:cTn id="167" fill="hold">
                             <p:stCondLst>
                               <p:cond delay="1000"/>
                             </p:stCondLst>
                             <p:childTnLst>
                               <p:par>
-                                <p:cTn id="163" presetID="14" presetClass="entr" presetSubtype="10" fill="hold" nodeType="afterEffect">
+                                <p:cTn id="168" presetID="14" presetClass="entr" presetSubtype="10" fill="hold" nodeType="afterEffect">
                                   <p:stCondLst>
                                     <p:cond delay="0"/>
                                   </p:stCondLst>
                                   <p:childTnLst>
                                     <p:set>
                                       <p:cBhvr>
-                                        <p:cTn id="164" dur="1" fill="hold">
+                                        <p:cTn id="169" dur="1" fill="hold">
                                           <p:stCondLst>
                                             <p:cond delay="0"/>
                                           </p:stCondLst>
@@ -14744,7 +15071,7 @@
                                     </p:set>
                                     <p:animEffect transition="in" filter="randombar(horizontal)">
                                       <p:cBhvr>
-                                        <p:cTn id="165" dur="500"/>
+                                        <p:cTn id="170" dur="500"/>
                                         <p:tgtEl>
                                           <p:spTgt spid="27"/>
                                         </p:tgtEl>
@@ -14757,20 +15084,20 @@
                           </p:cTn>
                         </p:par>
                         <p:par>
-                          <p:cTn id="166" fill="hold">
+                          <p:cTn id="171" fill="hold">
                             <p:stCondLst>
                               <p:cond delay="1500"/>
                             </p:stCondLst>
                             <p:childTnLst>
                               <p:par>
-                                <p:cTn id="167" presetID="14" presetClass="entr" presetSubtype="10" fill="hold" nodeType="afterEffect">
+                                <p:cTn id="172" presetID="14" presetClass="entr" presetSubtype="10" fill="hold" nodeType="afterEffect">
                                   <p:stCondLst>
                                     <p:cond delay="0"/>
                                   </p:stCondLst>
                                   <p:childTnLst>
                                     <p:set>
                                       <p:cBhvr>
-                                        <p:cTn id="168" dur="1" fill="hold">
+                                        <p:cTn id="173" dur="1" fill="hold">
                                           <p:stCondLst>
                                             <p:cond delay="0"/>
                                           </p:stCondLst>
@@ -14788,7 +15115,7 @@
                                     </p:set>
                                     <p:animEffect transition="in" filter="randombar(horizontal)">
                                       <p:cBhvr>
-                                        <p:cTn id="169" dur="500"/>
+                                        <p:cTn id="174" dur="500"/>
                                         <p:tgtEl>
                                           <p:spTgt spid="14"/>
                                         </p:tgtEl>
@@ -14801,20 +15128,20 @@
                           </p:cTn>
                         </p:par>
                         <p:par>
-                          <p:cTn id="170" fill="hold">
+                          <p:cTn id="175" fill="hold">
                             <p:stCondLst>
                               <p:cond delay="2000"/>
                             </p:stCondLst>
                             <p:childTnLst>
                               <p:par>
-                                <p:cTn id="171" presetID="14" presetClass="entr" presetSubtype="10" fill="hold" grpId="0" nodeType="afterEffect">
+                                <p:cTn id="176" presetID="14" presetClass="entr" presetSubtype="10" fill="hold" grpId="0" nodeType="afterEffect">
                                   <p:stCondLst>
                                     <p:cond delay="0"/>
                                   </p:stCondLst>
                                   <p:childTnLst>
                                     <p:set>
                                       <p:cBhvr>
-                                        <p:cTn id="172" dur="1" fill="hold">
+                                        <p:cTn id="177" dur="1" fill="hold">
                                           <p:stCondLst>
                                             <p:cond delay="0"/>
                                           </p:stCondLst>
@@ -14832,7 +15159,7 @@
                                     </p:set>
                                     <p:animEffect transition="in" filter="randombar(horizontal)">
                                       <p:cBhvr>
-                                        <p:cTn id="173" dur="500"/>
+                                        <p:cTn id="178" dur="500"/>
                                         <p:tgtEl>
                                           <p:spTgt spid="61"/>
                                         </p:tgtEl>
@@ -14845,20 +15172,20 @@
                           </p:cTn>
                         </p:par>
                         <p:par>
-                          <p:cTn id="174" fill="hold">
+                          <p:cTn id="179" fill="hold">
                             <p:stCondLst>
                               <p:cond delay="2500"/>
                             </p:stCondLst>
                             <p:childTnLst>
                               <p:par>
-                                <p:cTn id="175" presetID="14" presetClass="entr" presetSubtype="10" fill="hold" nodeType="afterEffect">
+                                <p:cTn id="180" presetID="14" presetClass="entr" presetSubtype="10" fill="hold" nodeType="afterEffect">
                                   <p:stCondLst>
                                     <p:cond delay="0"/>
                                   </p:stCondLst>
                                   <p:childTnLst>
                                     <p:set>
                                       <p:cBhvr>
-                                        <p:cTn id="176" dur="1" fill="hold">
+                                        <p:cTn id="181" dur="1" fill="hold">
                                           <p:stCondLst>
                                             <p:cond delay="0"/>
                                           </p:stCondLst>
@@ -14876,7 +15203,7 @@
                                     </p:set>
                                     <p:animEffect transition="in" filter="randombar(horizontal)">
                                       <p:cBhvr>
-                                        <p:cTn id="177" dur="500"/>
+                                        <p:cTn id="182" dur="500"/>
                                         <p:tgtEl>
                                           <p:spTgt spid="28"/>
                                         </p:tgtEl>
@@ -14885,15 +15212,33 @@
                                   </p:childTnLst>
                                 </p:cTn>
                               </p:par>
+                            </p:childTnLst>
+                          </p:cTn>
+                        </p:par>
+                      </p:childTnLst>
+                    </p:cTn>
+                  </p:par>
+                  <p:par>
+                    <p:cTn id="183" fill="hold">
+                      <p:stCondLst>
+                        <p:cond delay="indefinite"/>
+                      </p:stCondLst>
+                      <p:childTnLst>
+                        <p:par>
+                          <p:cTn id="184" fill="hold">
+                            <p:stCondLst>
+                              <p:cond delay="0"/>
+                            </p:stCondLst>
+                            <p:childTnLst>
                               <p:par>
-                                <p:cTn id="178" presetID="14" presetClass="entr" presetSubtype="10" fill="hold" grpId="0" nodeType="withEffect">
+                                <p:cTn id="185" presetID="14" presetClass="entr" presetSubtype="10" fill="hold" grpId="0" nodeType="clickEffect">
                                   <p:stCondLst>
                                     <p:cond delay="0"/>
                                   </p:stCondLst>
                                   <p:childTnLst>
                                     <p:set>
                                       <p:cBhvr>
-                                        <p:cTn id="179" dur="1" fill="hold">
+                                        <p:cTn id="186" dur="1" fill="hold">
                                           <p:stCondLst>
                                             <p:cond delay="0"/>
                                           </p:stCondLst>
@@ -14911,7 +15256,7 @@
                                     </p:set>
                                     <p:animEffect transition="in" filter="randombar(horizontal)">
                                       <p:cBhvr>
-                                        <p:cTn id="180" dur="500"/>
+                                        <p:cTn id="187" dur="500"/>
                                         <p:tgtEl>
                                           <p:spTgt spid="56"/>
                                         </p:tgtEl>
@@ -14921,14 +15266,14 @@
                                 </p:cTn>
                               </p:par>
                               <p:par>
-                                <p:cTn id="181" presetID="14" presetClass="entr" presetSubtype="10" fill="hold" grpId="0" nodeType="withEffect">
+                                <p:cTn id="188" presetID="14" presetClass="entr" presetSubtype="10" fill="hold" grpId="0" nodeType="withEffect">
                                   <p:stCondLst>
                                     <p:cond delay="0"/>
                                   </p:stCondLst>
                                   <p:childTnLst>
                                     <p:set>
                                       <p:cBhvr>
-                                        <p:cTn id="182" dur="1" fill="hold">
+                                        <p:cTn id="189" dur="1" fill="hold">
                                           <p:stCondLst>
                                             <p:cond delay="0"/>
                                           </p:stCondLst>
@@ -14946,7 +15291,7 @@
                                     </p:set>
                                     <p:animEffect transition="in" filter="randombar(horizontal)">
                                       <p:cBhvr>
-                                        <p:cTn id="183" dur="500"/>
+                                        <p:cTn id="190" dur="500"/>
                                         <p:tgtEl>
                                           <p:spTgt spid="84"/>
                                         </p:tgtEl>
@@ -14956,14 +15301,14 @@
                                 </p:cTn>
                               </p:par>
                               <p:par>
-                                <p:cTn id="184" presetID="14" presetClass="entr" presetSubtype="10" fill="hold" grpId="0" nodeType="withEffect">
+                                <p:cTn id="191" presetID="14" presetClass="entr" presetSubtype="10" fill="hold" grpId="0" nodeType="withEffect">
                                   <p:stCondLst>
                                     <p:cond delay="0"/>
                                   </p:stCondLst>
                                   <p:childTnLst>
                                     <p:set>
                                       <p:cBhvr>
-                                        <p:cTn id="185" dur="1" fill="hold">
+                                        <p:cTn id="192" dur="1" fill="hold">
                                           <p:stCondLst>
                                             <p:cond delay="0"/>
                                           </p:stCondLst>
@@ -14981,7 +15326,7 @@
                                     </p:set>
                                     <p:animEffect transition="in" filter="randombar(horizontal)">
                                       <p:cBhvr>
-                                        <p:cTn id="186" dur="500"/>
+                                        <p:cTn id="193" dur="500"/>
                                         <p:tgtEl>
                                           <p:spTgt spid="1025"/>
                                         </p:tgtEl>
@@ -14991,14 +15336,14 @@
                                 </p:cTn>
                               </p:par>
                               <p:par>
-                                <p:cTn id="187" presetID="14" presetClass="entr" presetSubtype="10" fill="hold" grpId="0" nodeType="withEffect">
+                                <p:cTn id="194" presetID="14" presetClass="entr" presetSubtype="10" fill="hold" grpId="0" nodeType="withEffect">
                                   <p:stCondLst>
                                     <p:cond delay="0"/>
                                   </p:stCondLst>
                                   <p:childTnLst>
                                     <p:set>
                                       <p:cBhvr>
-                                        <p:cTn id="188" dur="1" fill="hold">
+                                        <p:cTn id="195" dur="1" fill="hold">
                                           <p:stCondLst>
                                             <p:cond delay="0"/>
                                           </p:stCondLst>
@@ -15016,7 +15361,7 @@
                                     </p:set>
                                     <p:animEffect transition="in" filter="randombar(horizontal)">
                                       <p:cBhvr>
-                                        <p:cTn id="189" dur="500"/>
+                                        <p:cTn id="196" dur="500"/>
                                         <p:tgtEl>
                                           <p:spTgt spid="1024"/>
                                         </p:tgtEl>
@@ -15032,26 +15377,26 @@
                     </p:cTn>
                   </p:par>
                   <p:par>
-                    <p:cTn id="190" fill="hold">
+                    <p:cTn id="197" fill="hold">
                       <p:stCondLst>
                         <p:cond delay="indefinite"/>
                       </p:stCondLst>
                       <p:childTnLst>
                         <p:par>
-                          <p:cTn id="191" fill="hold">
+                          <p:cTn id="198" fill="hold">
                             <p:stCondLst>
                               <p:cond delay="0"/>
                             </p:stCondLst>
                             <p:childTnLst>
                               <p:par>
-                                <p:cTn id="192" presetID="14" presetClass="entr" presetSubtype="10" fill="hold" nodeType="clickEffect">
+                                <p:cTn id="199" presetID="22" presetClass="entr" presetSubtype="8" fill="hold" nodeType="clickEffect">
                                   <p:stCondLst>
                                     <p:cond delay="0"/>
                                   </p:stCondLst>
                                   <p:childTnLst>
                                     <p:set>
                                       <p:cBhvr>
-                                        <p:cTn id="193" dur="1" fill="hold">
+                                        <p:cTn id="200" dur="1" fill="hold">
                                           <p:stCondLst>
                                             <p:cond delay="0"/>
                                           </p:stCondLst>
@@ -15067,9 +15412,9 @@
                                         <p:strVal val="visible"/>
                                       </p:to>
                                     </p:set>
-                                    <p:animEffect transition="in" filter="randombar(horizontal)">
+                                    <p:animEffect transition="in" filter="wipe(left)">
                                       <p:cBhvr>
-                                        <p:cTn id="194" dur="500"/>
+                                        <p:cTn id="201" dur="500"/>
                                         <p:tgtEl>
                                           <p:spTgt spid="57"/>
                                         </p:tgtEl>
@@ -15085,26 +15430,26 @@
                     </p:cTn>
                   </p:par>
                   <p:par>
-                    <p:cTn id="195" fill="hold">
+                    <p:cTn id="202" fill="hold">
                       <p:stCondLst>
                         <p:cond delay="indefinite"/>
                       </p:stCondLst>
                       <p:childTnLst>
                         <p:par>
-                          <p:cTn id="196" fill="hold">
+                          <p:cTn id="203" fill="hold">
                             <p:stCondLst>
                               <p:cond delay="0"/>
                             </p:stCondLst>
                             <p:childTnLst>
                               <p:par>
-                                <p:cTn id="197" presetID="14" presetClass="entr" presetSubtype="10" fill="hold" nodeType="clickEffect">
+                                <p:cTn id="204" presetID="22" presetClass="entr" presetSubtype="8" fill="hold" nodeType="clickEffect">
                                   <p:stCondLst>
                                     <p:cond delay="0"/>
                                   </p:stCondLst>
                                   <p:childTnLst>
                                     <p:set>
                                       <p:cBhvr>
-                                        <p:cTn id="198" dur="1" fill="hold">
+                                        <p:cTn id="205" dur="1" fill="hold">
                                           <p:stCondLst>
                                             <p:cond delay="0"/>
                                           </p:stCondLst>
@@ -15120,9 +15465,9 @@
                                         <p:strVal val="visible"/>
                                       </p:to>
                                     </p:set>
-                                    <p:animEffect transition="in" filter="randombar(horizontal)">
+                                    <p:animEffect transition="in" filter="wipe(left)">
                                       <p:cBhvr>
-                                        <p:cTn id="199" dur="500"/>
+                                        <p:cTn id="206" dur="500"/>
                                         <p:tgtEl>
                                           <p:spTgt spid="85"/>
                                         </p:tgtEl>
@@ -15138,26 +15483,26 @@
                     </p:cTn>
                   </p:par>
                   <p:par>
-                    <p:cTn id="200" fill="hold">
+                    <p:cTn id="207" fill="hold">
                       <p:stCondLst>
                         <p:cond delay="indefinite"/>
                       </p:stCondLst>
                       <p:childTnLst>
                         <p:par>
-                          <p:cTn id="201" fill="hold">
+                          <p:cTn id="208" fill="hold">
                             <p:stCondLst>
                               <p:cond delay="0"/>
                             </p:stCondLst>
                             <p:childTnLst>
                               <p:par>
-                                <p:cTn id="202" presetID="14" presetClass="entr" presetSubtype="10" fill="hold" nodeType="clickEffect">
+                                <p:cTn id="209" presetID="22" presetClass="entr" presetSubtype="8" fill="hold" nodeType="clickEffect">
                                   <p:stCondLst>
                                     <p:cond delay="0"/>
                                   </p:stCondLst>
                                   <p:childTnLst>
                                     <p:set>
                                       <p:cBhvr>
-                                        <p:cTn id="203" dur="1" fill="hold">
+                                        <p:cTn id="210" dur="1" fill="hold">
                                           <p:stCondLst>
                                             <p:cond delay="0"/>
                                           </p:stCondLst>
@@ -15173,9 +15518,9 @@
                                         <p:strVal val="visible"/>
                                       </p:to>
                                     </p:set>
-                                    <p:animEffect transition="in" filter="randombar(horizontal)">
+                                    <p:animEffect transition="in" filter="wipe(left)">
                                       <p:cBhvr>
-                                        <p:cTn id="204" dur="500"/>
+                                        <p:cTn id="211" dur="500"/>
                                         <p:tgtEl>
                                           <p:spTgt spid="60"/>
                                         </p:tgtEl>
@@ -15185,14 +15530,67 @@
                                 </p:cTn>
                               </p:par>
                               <p:par>
-                                <p:cTn id="205" presetID="14" presetClass="entr" presetSubtype="10" fill="hold" nodeType="withEffect">
+                                <p:cTn id="212" presetID="22" presetClass="entr" presetSubtype="8" fill="hold" nodeType="withEffect">
                                   <p:stCondLst>
                                     <p:cond delay="0"/>
                                   </p:stCondLst>
                                   <p:childTnLst>
                                     <p:set>
                                       <p:cBhvr>
-                                        <p:cTn id="206" dur="1" fill="hold">
+                                        <p:cTn id="213" dur="1" fill="hold">
+                                          <p:stCondLst>
+                                            <p:cond delay="0"/>
+                                          </p:stCondLst>
+                                        </p:cTn>
+                                        <p:tgtEl>
+                                          <p:spTgt spid="101"/>
+                                        </p:tgtEl>
+                                        <p:attrNameLst>
+                                          <p:attrName>style.visibility</p:attrName>
+                                        </p:attrNameLst>
+                                      </p:cBhvr>
+                                      <p:to>
+                                        <p:strVal val="visible"/>
+                                      </p:to>
+                                    </p:set>
+                                    <p:animEffect transition="in" filter="wipe(left)">
+                                      <p:cBhvr>
+                                        <p:cTn id="214" dur="500"/>
+                                        <p:tgtEl>
+                                          <p:spTgt spid="101"/>
+                                        </p:tgtEl>
+                                      </p:cBhvr>
+                                    </p:animEffect>
+                                  </p:childTnLst>
+                                </p:cTn>
+                              </p:par>
+                            </p:childTnLst>
+                          </p:cTn>
+                        </p:par>
+                      </p:childTnLst>
+                    </p:cTn>
+                  </p:par>
+                  <p:par>
+                    <p:cTn id="215" fill="hold">
+                      <p:stCondLst>
+                        <p:cond delay="indefinite"/>
+                      </p:stCondLst>
+                      <p:childTnLst>
+                        <p:par>
+                          <p:cTn id="216" fill="hold">
+                            <p:stCondLst>
+                              <p:cond delay="0"/>
+                            </p:stCondLst>
+                            <p:childTnLst>
+                              <p:par>
+                                <p:cTn id="217" presetID="22" presetClass="entr" presetSubtype="8" fill="hold" nodeType="clickEffect">
+                                  <p:stCondLst>
+                                    <p:cond delay="0"/>
+                                  </p:stCondLst>
+                                  <p:childTnLst>
+                                    <p:set>
+                                      <p:cBhvr>
+                                        <p:cTn id="218" dur="1" fill="hold">
                                           <p:stCondLst>
                                             <p:cond delay="0"/>
                                           </p:stCondLst>
@@ -15208,9 +15606,9 @@
                                         <p:strVal val="visible"/>
                                       </p:to>
                                     </p:set>
-                                    <p:animEffect transition="in" filter="randombar(horizontal)">
+                                    <p:animEffect transition="in" filter="wipe(left)">
                                       <p:cBhvr>
-                                        <p:cTn id="207" dur="500"/>
+                                        <p:cTn id="219" dur="500"/>
                                         <p:tgtEl>
                                           <p:spTgt spid="68"/>
                                         </p:tgtEl>
@@ -15220,14 +15618,14 @@
                                 </p:cTn>
                               </p:par>
                               <p:par>
-                                <p:cTn id="208" presetID="14" presetClass="entr" presetSubtype="10" fill="hold" nodeType="withEffect">
+                                <p:cTn id="220" presetID="22" presetClass="entr" presetSubtype="8" fill="hold" nodeType="withEffect">
                                   <p:stCondLst>
                                     <p:cond delay="0"/>
                                   </p:stCondLst>
                                   <p:childTnLst>
                                     <p:set>
                                       <p:cBhvr>
-                                        <p:cTn id="209" dur="1" fill="hold">
+                                        <p:cTn id="221" dur="1" fill="hold">
                                           <p:stCondLst>
                                             <p:cond delay="0"/>
                                           </p:stCondLst>
@@ -15243,9 +15641,9 @@
                                         <p:strVal val="visible"/>
                                       </p:to>
                                     </p:set>
-                                    <p:animEffect transition="in" filter="randombar(horizontal)">
+                                    <p:animEffect transition="in" filter="wipe(left)">
                                       <p:cBhvr>
-                                        <p:cTn id="210" dur="500"/>
+                                        <p:cTn id="222" dur="500"/>
                                         <p:tgtEl>
                                           <p:spTgt spid="98"/>
                                         </p:tgtEl>
@@ -15255,49 +15653,14 @@
                                 </p:cTn>
                               </p:par>
                               <p:par>
-                                <p:cTn id="211" presetID="14" presetClass="entr" presetSubtype="10" fill="hold" nodeType="withEffect">
+                                <p:cTn id="223" presetID="14" presetClass="entr" presetSubtype="10" fill="hold" grpId="0" nodeType="withEffect">
                                   <p:stCondLst>
                                     <p:cond delay="0"/>
                                   </p:stCondLst>
                                   <p:childTnLst>
                                     <p:set>
                                       <p:cBhvr>
-                                        <p:cTn id="212" dur="1" fill="hold">
-                                          <p:stCondLst>
-                                            <p:cond delay="0"/>
-                                          </p:stCondLst>
-                                        </p:cTn>
-                                        <p:tgtEl>
-                                          <p:spTgt spid="101"/>
-                                        </p:tgtEl>
-                                        <p:attrNameLst>
-                                          <p:attrName>style.visibility</p:attrName>
-                                        </p:attrNameLst>
-                                      </p:cBhvr>
-                                      <p:to>
-                                        <p:strVal val="visible"/>
-                                      </p:to>
-                                    </p:set>
-                                    <p:animEffect transition="in" filter="randombar(horizontal)">
-                                      <p:cBhvr>
-                                        <p:cTn id="213" dur="500"/>
-                                        <p:tgtEl>
-                                          <p:spTgt spid="101"/>
-                                        </p:tgtEl>
-                                      </p:cBhvr>
-                                    </p:animEffect>
-                                  </p:childTnLst>
-                                </p:cTn>
-                              </p:par>
-                              <p:par>
-                                <p:cTn id="214" presetID="14" presetClass="entr" presetSubtype="10" fill="hold" grpId="0" nodeType="withEffect">
-                                  <p:stCondLst>
-                                    <p:cond delay="0"/>
-                                  </p:stCondLst>
-                                  <p:childTnLst>
-                                    <p:set>
-                                      <p:cBhvr>
-                                        <p:cTn id="215" dur="1" fill="hold">
+                                        <p:cTn id="224" dur="1" fill="hold">
                                           <p:stCondLst>
                                             <p:cond delay="0"/>
                                           </p:stCondLst>
@@ -15315,7 +15678,7 @@
                                     </p:set>
                                     <p:animEffect transition="in" filter="randombar(horizontal)">
                                       <p:cBhvr>
-                                        <p:cTn id="216" dur="500"/>
+                                        <p:cTn id="225" dur="500"/>
                                         <p:tgtEl>
                                           <p:spTgt spid="67"/>
                                         </p:tgtEl>
@@ -15331,26 +15694,26 @@
                     </p:cTn>
                   </p:par>
                   <p:par>
-                    <p:cTn id="217" fill="hold">
+                    <p:cTn id="226" fill="hold">
                       <p:stCondLst>
                         <p:cond delay="indefinite"/>
                       </p:stCondLst>
                       <p:childTnLst>
                         <p:par>
-                          <p:cTn id="218" fill="hold">
+                          <p:cTn id="227" fill="hold">
                             <p:stCondLst>
                               <p:cond delay="0"/>
                             </p:stCondLst>
                             <p:childTnLst>
                               <p:par>
-                                <p:cTn id="219" presetID="14" presetClass="entr" presetSubtype="10" fill="hold" nodeType="clickEffect">
+                                <p:cTn id="228" presetID="14" presetClass="entr" presetSubtype="10" fill="hold" nodeType="clickEffect">
                                   <p:stCondLst>
                                     <p:cond delay="0"/>
                                   </p:stCondLst>
                                   <p:childTnLst>
                                     <p:set>
                                       <p:cBhvr>
-                                        <p:cTn id="220" dur="1" fill="hold">
+                                        <p:cTn id="229" dur="1" fill="hold">
                                           <p:stCondLst>
                                             <p:cond delay="0"/>
                                           </p:stCondLst>
@@ -15368,7 +15731,7 @@
                                     </p:set>
                                     <p:animEffect transition="in" filter="randombar(horizontal)">
                                       <p:cBhvr>
-                                        <p:cTn id="221" dur="500"/>
+                                        <p:cTn id="230" dur="500"/>
                                         <p:tgtEl>
                                           <p:spTgt spid="29"/>
                                         </p:tgtEl>
@@ -15384,26 +15747,26 @@
                     </p:cTn>
                   </p:par>
                   <p:par>
-                    <p:cTn id="222" fill="hold">
+                    <p:cTn id="231" fill="hold">
                       <p:stCondLst>
                         <p:cond delay="indefinite"/>
                       </p:stCondLst>
                       <p:childTnLst>
                         <p:par>
-                          <p:cTn id="223" fill="hold">
+                          <p:cTn id="232" fill="hold">
                             <p:stCondLst>
                               <p:cond delay="0"/>
                             </p:stCondLst>
                             <p:childTnLst>
                               <p:par>
-                                <p:cTn id="224" presetID="26" presetClass="emph" presetSubtype="0" fill="hold" nodeType="clickEffect">
+                                <p:cTn id="233" presetID="26" presetClass="emph" presetSubtype="0" fill="hold" nodeType="clickEffect">
                                   <p:stCondLst>
                                     <p:cond delay="0"/>
                                   </p:stCondLst>
                                   <p:childTnLst>
                                     <p:animEffect transition="out" filter="fade">
                                       <p:cBhvr>
-                                        <p:cTn id="225" dur="500" tmFilter="0, 0; .2, .5; .8, .5; 1, 0"/>
+                                        <p:cTn id="234" dur="500" tmFilter="0, 0; .2, .5; .8, .5; 1, 0"/>
                                         <p:tgtEl>
                                           <p:spTgt spid="29"/>
                                         </p:tgtEl>
@@ -15411,7 +15774,7 @@
                                     </p:animEffect>
                                     <p:animScale>
                                       <p:cBhvr>
-                                        <p:cTn id="226" dur="250" autoRev="1" fill="hold"/>
+                                        <p:cTn id="235" dur="250" autoRev="1" fill="hold"/>
                                         <p:tgtEl>
                                           <p:spTgt spid="29"/>
                                         </p:tgtEl>
@@ -15462,6 +15825,7 @@
       </p:bldGraphic>
       <p:bldP spid="56" grpId="0" animBg="1"/>
       <p:bldP spid="67" grpId="0" animBg="1"/>
+      <p:bldP spid="3" grpId="0" animBg="1"/>
       <p:bldP spid="61" grpId="0" animBg="1"/>
       <p:bldP spid="97" grpId="0" animBg="1"/>
       <p:bldP spid="1024" grpId="0"/>

</xml_diff>